<commit_message>
Updated refsq-22-hasso study to be harmonic with the other studies
</commit_message>
<xml_diff>
--- a/presentation/aire24-activity-slides.pptx
+++ b/presentation/aire24-activity-slides.pptx
@@ -5,7 +5,7 @@
     <p:sldMasterId id="2147483648" r:id="rId1"/>
   </p:sldMasterIdLst>
   <p:notesMasterIdLst>
-    <p:notesMasterId r:id="rId18"/>
+    <p:notesMasterId r:id="rId19"/>
   </p:notesMasterIdLst>
   <p:sldIdLst>
     <p:sldId id="256" r:id="rId2"/>
@@ -13,17 +13,18 @@
     <p:sldId id="259" r:id="rId4"/>
     <p:sldId id="257" r:id="rId5"/>
     <p:sldId id="260" r:id="rId6"/>
-    <p:sldId id="266" r:id="rId7"/>
-    <p:sldId id="267" r:id="rId8"/>
-    <p:sldId id="268" r:id="rId9"/>
-    <p:sldId id="269" r:id="rId10"/>
-    <p:sldId id="270" r:id="rId11"/>
-    <p:sldId id="271" r:id="rId12"/>
-    <p:sldId id="261" r:id="rId13"/>
-    <p:sldId id="262" r:id="rId14"/>
-    <p:sldId id="263" r:id="rId15"/>
-    <p:sldId id="265" r:id="rId16"/>
-    <p:sldId id="264" r:id="rId17"/>
+    <p:sldId id="272" r:id="rId7"/>
+    <p:sldId id="266" r:id="rId8"/>
+    <p:sldId id="267" r:id="rId9"/>
+    <p:sldId id="268" r:id="rId10"/>
+    <p:sldId id="269" r:id="rId11"/>
+    <p:sldId id="270" r:id="rId12"/>
+    <p:sldId id="271" r:id="rId13"/>
+    <p:sldId id="261" r:id="rId14"/>
+    <p:sldId id="262" r:id="rId15"/>
+    <p:sldId id="263" r:id="rId16"/>
+    <p:sldId id="265" r:id="rId17"/>
+    <p:sldId id="264" r:id="rId18"/>
   </p:sldIdLst>
   <p:sldSz cx="12192000" cy="6858000"/>
   <p:notesSz cx="6858000" cy="9144000"/>
@@ -212,7 +213,7 @@
           <a:p>
             <a:fld id="{7AB9B015-181D-4176-A353-DC3365C9F9AD}" type="datetimeFigureOut">
               <a:rPr lang="en-US" smtClean="0"/>
-              <a:t>6/20/2024</a:t>
+              <a:t>6/24/2024</a:t>
             </a:fld>
             <a:endParaRPr lang="en-US"/>
           </a:p>
@@ -710,7 +711,7 @@
           <a:p>
             <a:fld id="{EC04D968-727E-47D5-9221-4C9CC05476E1}" type="datetime1">
               <a:rPr lang="de-DE" smtClean="0"/>
-              <a:t>20.06.2024</a:t>
+              <a:t>24.06.2024</a:t>
             </a:fld>
             <a:endParaRPr lang="en-US"/>
           </a:p>
@@ -911,7 +912,7 @@
           <a:p>
             <a:fld id="{3EB3D454-5208-4615-B45B-C4C7C092A86D}" type="datetime1">
               <a:rPr lang="de-DE" smtClean="0"/>
-              <a:t>20.06.2024</a:t>
+              <a:t>24.06.2024</a:t>
             </a:fld>
             <a:endParaRPr lang="en-US"/>
           </a:p>
@@ -1122,7 +1123,7 @@
           <a:p>
             <a:fld id="{A036C1BE-A7A6-49D4-90EF-768F4B7B9F79}" type="datetime1">
               <a:rPr lang="de-DE" smtClean="0"/>
-              <a:t>20.06.2024</a:t>
+              <a:t>24.06.2024</a:t>
             </a:fld>
             <a:endParaRPr lang="en-US"/>
           </a:p>
@@ -1323,7 +1324,7 @@
           <a:p>
             <a:fld id="{87D4ACF0-553C-49B0-BBA6-EA2ECC95E3DB}" type="datetime1">
               <a:rPr lang="de-DE" smtClean="0"/>
-              <a:t>20.06.2024</a:t>
+              <a:t>24.06.2024</a:t>
             </a:fld>
             <a:endParaRPr lang="en-US"/>
           </a:p>
@@ -1601,7 +1602,7 @@
           <a:p>
             <a:fld id="{938A65DE-B3E1-43BB-A5C0-8D5048234618}" type="datetime1">
               <a:rPr lang="de-DE" smtClean="0"/>
-              <a:t>20.06.2024</a:t>
+              <a:t>24.06.2024</a:t>
             </a:fld>
             <a:endParaRPr lang="en-US"/>
           </a:p>
@@ -1869,7 +1870,7 @@
           <a:p>
             <a:fld id="{1F34C837-8733-432A-90A3-4FAF82C8AB8A}" type="datetime1">
               <a:rPr lang="de-DE" smtClean="0"/>
-              <a:t>20.06.2024</a:t>
+              <a:t>24.06.2024</a:t>
             </a:fld>
             <a:endParaRPr lang="en-US"/>
           </a:p>
@@ -2284,7 +2285,7 @@
           <a:p>
             <a:fld id="{97C9F011-8B69-40E3-9989-B0C966054F62}" type="datetime1">
               <a:rPr lang="de-DE" smtClean="0"/>
-              <a:t>20.06.2024</a:t>
+              <a:t>24.06.2024</a:t>
             </a:fld>
             <a:endParaRPr lang="en-US"/>
           </a:p>
@@ -2428,7 +2429,7 @@
           <a:p>
             <a:fld id="{B00D4CC5-5253-471B-BB89-27B986A94313}" type="datetime1">
               <a:rPr lang="de-DE" smtClean="0"/>
-              <a:t>20.06.2024</a:t>
+              <a:t>24.06.2024</a:t>
             </a:fld>
             <a:endParaRPr lang="en-US"/>
           </a:p>
@@ -2544,7 +2545,7 @@
           <a:p>
             <a:fld id="{4AC3FD81-BE11-40E2-85C3-88ACDB964AF1}" type="datetime1">
               <a:rPr lang="de-DE" smtClean="0"/>
-              <a:t>20.06.2024</a:t>
+              <a:t>24.06.2024</a:t>
             </a:fld>
             <a:endParaRPr lang="en-US"/>
           </a:p>
@@ -2858,7 +2859,7 @@
           <a:p>
             <a:fld id="{E74E03BA-EF74-4A7F-8513-CB3C81648EE8}" type="datetime1">
               <a:rPr lang="de-DE" smtClean="0"/>
-              <a:t>20.06.2024</a:t>
+              <a:t>24.06.2024</a:t>
             </a:fld>
             <a:endParaRPr lang="en-US"/>
           </a:p>
@@ -3149,7 +3150,7 @@
           <a:p>
             <a:fld id="{B8F66E65-E821-497F-88DB-01B6B2557574}" type="datetime1">
               <a:rPr lang="de-DE" smtClean="0"/>
-              <a:t>20.06.2024</a:t>
+              <a:t>24.06.2024</a:t>
             </a:fld>
             <a:endParaRPr lang="en-US"/>
           </a:p>
@@ -3393,7 +3394,7 @@
           <a:p>
             <a:fld id="{430D1B83-2CFB-4316-A13A-060E80373387}" type="datetime1">
               <a:rPr lang="de-DE" smtClean="0"/>
-              <a:t>20.06.2024</a:t>
+              <a:t>24.06.2024</a:t>
             </a:fld>
             <a:endParaRPr lang="en-US"/>
           </a:p>
@@ -4205,7 +4206,7 @@
           <p:cNvPr id="2" name="Title 1">
             <a:extLst>
               <a:ext uri="{FF2B5EF4-FFF2-40B4-BE49-F238E27FC236}">
-                <a16:creationId xmlns:a16="http://schemas.microsoft.com/office/drawing/2014/main" id="{106886CA-8C99-908B-7636-73CB9158C292}"/>
+                <a16:creationId xmlns:a16="http://schemas.microsoft.com/office/drawing/2014/main" id="{7682A068-B61D-B240-CDCD-ACEE5A89BC77}"/>
               </a:ext>
             </a:extLst>
           </p:cNvPr>
@@ -4231,10 +4232,126 @@
       </p:sp>
       <p:sp>
         <p:nvSpPr>
-          <p:cNvPr id="3" name="Content Placeholder 2">
-            <a:extLst>
-              <a:ext uri="{FF2B5EF4-FFF2-40B4-BE49-F238E27FC236}">
-                <a16:creationId xmlns:a16="http://schemas.microsoft.com/office/drawing/2014/main" id="{73C700F8-9BE8-6A10-3874-AB370FF4247A}"/>
+          <p:cNvPr id="4" name="Date Placeholder 3">
+            <a:extLst>
+              <a:ext uri="{FF2B5EF4-FFF2-40B4-BE49-F238E27FC236}">
+                <a16:creationId xmlns:a16="http://schemas.microsoft.com/office/drawing/2014/main" id="{F165B01C-24D6-A9E1-8EFA-5E9136366050}"/>
+              </a:ext>
+            </a:extLst>
+          </p:cNvPr>
+          <p:cNvSpPr>
+            <a:spLocks noGrp="1"/>
+          </p:cNvSpPr>
+          <p:nvPr>
+            <p:ph type="dt" sz="half" idx="10"/>
+          </p:nvPr>
+        </p:nvSpPr>
+        <p:spPr/>
+        <p:txBody>
+          <a:bodyPr/>
+          <a:lstStyle/>
+          <a:p>
+            <a:fld id="{87D4ACF0-553C-49B0-BBA6-EA2ECC95E3DB}" type="datetime1">
+              <a:rPr lang="de-DE" smtClean="0"/>
+              <a:t>24.06.2024</a:t>
+            </a:fld>
+            <a:endParaRPr lang="en-US"/>
+          </a:p>
+        </p:txBody>
+      </p:sp>
+      <p:sp>
+        <p:nvSpPr>
+          <p:cNvPr id="5" name="Footer Placeholder 4">
+            <a:extLst>
+              <a:ext uri="{FF2B5EF4-FFF2-40B4-BE49-F238E27FC236}">
+                <a16:creationId xmlns:a16="http://schemas.microsoft.com/office/drawing/2014/main" id="{20044D52-363C-F514-978E-71D0DEE2E2CE}"/>
+              </a:ext>
+            </a:extLst>
+          </p:cNvPr>
+          <p:cNvSpPr>
+            <a:spLocks noGrp="1"/>
+          </p:cNvSpPr>
+          <p:nvPr>
+            <p:ph type="ftr" sz="quarter" idx="11"/>
+          </p:nvPr>
+        </p:nvSpPr>
+        <p:spPr/>
+        <p:txBody>
+          <a:bodyPr/>
+          <a:lstStyle/>
+          <a:p>
+            <a:r>
+              <a:rPr lang="en-US"/>
+              <a:t>AIRE'24</a:t>
+            </a:r>
+          </a:p>
+        </p:txBody>
+      </p:sp>
+      <p:sp>
+        <p:nvSpPr>
+          <p:cNvPr id="6" name="Slide Number Placeholder 5">
+            <a:extLst>
+              <a:ext uri="{FF2B5EF4-FFF2-40B4-BE49-F238E27FC236}">
+                <a16:creationId xmlns:a16="http://schemas.microsoft.com/office/drawing/2014/main" id="{30D9BBF3-3E89-1D80-9560-29D3D9EA74DB}"/>
+              </a:ext>
+            </a:extLst>
+          </p:cNvPr>
+          <p:cNvSpPr>
+            <a:spLocks noGrp="1"/>
+          </p:cNvSpPr>
+          <p:nvPr>
+            <p:ph type="sldNum" sz="quarter" idx="12"/>
+          </p:nvPr>
+        </p:nvSpPr>
+        <p:spPr/>
+        <p:txBody>
+          <a:bodyPr/>
+          <a:lstStyle/>
+          <a:p>
+            <a:fld id="{8CCD81E8-6E22-4792-904F-C3E1A440A2A0}" type="slidenum">
+              <a:rPr lang="en-US" smtClean="0"/>
+              <a:t>10</a:t>
+            </a:fld>
+            <a:endParaRPr lang="en-US"/>
+          </a:p>
+        </p:txBody>
+      </p:sp>
+      <p:pic>
+        <p:nvPicPr>
+          <p:cNvPr id="8" name="Picture 7">
+            <a:extLst>
+              <a:ext uri="{FF2B5EF4-FFF2-40B4-BE49-F238E27FC236}">
+                <a16:creationId xmlns:a16="http://schemas.microsoft.com/office/drawing/2014/main" id="{2684B3FB-18EE-D6AD-8B73-520C60AF8B29}"/>
+              </a:ext>
+            </a:extLst>
+          </p:cNvPr>
+          <p:cNvPicPr>
+            <a:picLocks noChangeAspect="1"/>
+          </p:cNvPicPr>
+          <p:nvPr/>
+        </p:nvPicPr>
+        <p:blipFill>
+          <a:blip r:embed="rId2"/>
+          <a:stretch>
+            <a:fillRect/>
+          </a:stretch>
+        </p:blipFill>
+        <p:spPr>
+          <a:xfrm>
+            <a:off x="2010229" y="2792257"/>
+            <a:ext cx="8171542" cy="4065743"/>
+          </a:xfrm>
+          <a:prstGeom prst="rect">
+            <a:avLst/>
+          </a:prstGeom>
+        </p:spPr>
+      </p:pic>
+      <p:sp>
+        <p:nvSpPr>
+          <p:cNvPr id="9" name="Content Placeholder 2">
+            <a:extLst>
+              <a:ext uri="{FF2B5EF4-FFF2-40B4-BE49-F238E27FC236}">
+                <a16:creationId xmlns:a16="http://schemas.microsoft.com/office/drawing/2014/main" id="{27E065FA-4B8B-8EBB-4853-97396ABA722F}"/>
               </a:ext>
             </a:extLst>
           </p:cNvPr>
@@ -4248,6 +4365,269 @@
         <p:spPr>
           <a:xfrm>
             <a:off x="838200" y="1825625"/>
+            <a:ext cx="10515600" cy="4351338"/>
+          </a:xfrm>
+        </p:spPr>
+        <p:txBody>
+          <a:bodyPr/>
+          <a:lstStyle/>
+          <a:p>
+            <a:pPr marL="514350" indent="-514350">
+              <a:buFont typeface="+mj-lt"/>
+              <a:buAutoNum type="arabicPeriod" startAt="3"/>
+            </a:pPr>
+            <a:r>
+              <a:rPr lang="en-US" b="1" dirty="0"/>
+              <a:t>Select an LLM </a:t>
+            </a:r>
+            <a:r>
+              <a:rPr lang="en-US" dirty="0"/>
+              <a:t>and enter the name and version to the </a:t>
+            </a:r>
+            <a:r>
+              <a:rPr lang="en-US" i="1" dirty="0"/>
+              <a:t>activity-report.md</a:t>
+            </a:r>
+          </a:p>
+          <a:p>
+            <a:endParaRPr lang="en-US" dirty="0"/>
+          </a:p>
+        </p:txBody>
+      </p:sp>
+      <p:sp>
+        <p:nvSpPr>
+          <p:cNvPr id="10" name="Rectangle: Rounded Corners 9">
+            <a:extLst>
+              <a:ext uri="{FF2B5EF4-FFF2-40B4-BE49-F238E27FC236}">
+                <a16:creationId xmlns:a16="http://schemas.microsoft.com/office/drawing/2014/main" id="{B521C97E-D883-F6ED-6791-92D32B0A6E9F}"/>
+              </a:ext>
+            </a:extLst>
+          </p:cNvPr>
+          <p:cNvSpPr/>
+          <p:nvPr/>
+        </p:nvSpPr>
+        <p:spPr>
+          <a:xfrm>
+            <a:off x="5189558" y="5219700"/>
+            <a:ext cx="1582717" cy="190500"/>
+          </a:xfrm>
+          <a:prstGeom prst="roundRect">
+            <a:avLst/>
+          </a:prstGeom>
+          <a:noFill/>
+          <a:ln w="28575">
+            <a:solidFill>
+              <a:srgbClr val="FFC000"/>
+            </a:solidFill>
+          </a:ln>
+        </p:spPr>
+        <p:style>
+          <a:lnRef idx="2">
+            <a:schemeClr val="accent1">
+              <a:shade val="15000"/>
+            </a:schemeClr>
+          </a:lnRef>
+          <a:fillRef idx="1">
+            <a:schemeClr val="accent1"/>
+          </a:fillRef>
+          <a:effectRef idx="0">
+            <a:schemeClr val="accent1"/>
+          </a:effectRef>
+          <a:fontRef idx="minor">
+            <a:schemeClr val="lt1"/>
+          </a:fontRef>
+        </p:style>
+        <p:txBody>
+          <a:bodyPr rtlCol="0" anchor="ctr"/>
+          <a:lstStyle/>
+          <a:p>
+            <a:pPr algn="ctr"/>
+            <a:endParaRPr lang="en-US"/>
+          </a:p>
+        </p:txBody>
+      </p:sp>
+      <p:sp>
+        <p:nvSpPr>
+          <p:cNvPr id="11" name="Rectangle: Rounded Corners 10">
+            <a:extLst>
+              <a:ext uri="{FF2B5EF4-FFF2-40B4-BE49-F238E27FC236}">
+                <a16:creationId xmlns:a16="http://schemas.microsoft.com/office/drawing/2014/main" id="{E220AFCB-84BE-D888-7499-0C52C60DA546}"/>
+              </a:ext>
+            </a:extLst>
+          </p:cNvPr>
+          <p:cNvSpPr/>
+          <p:nvPr/>
+        </p:nvSpPr>
+        <p:spPr>
+          <a:xfrm>
+            <a:off x="2712719" y="6356350"/>
+            <a:ext cx="6726555" cy="311150"/>
+          </a:xfrm>
+          <a:prstGeom prst="roundRect">
+            <a:avLst/>
+          </a:prstGeom>
+          <a:noFill/>
+          <a:ln w="28575">
+            <a:solidFill>
+              <a:srgbClr val="FFC000"/>
+            </a:solidFill>
+          </a:ln>
+        </p:spPr>
+        <p:style>
+          <a:lnRef idx="2">
+            <a:schemeClr val="accent1">
+              <a:shade val="15000"/>
+            </a:schemeClr>
+          </a:lnRef>
+          <a:fillRef idx="1">
+            <a:schemeClr val="accent1"/>
+          </a:fillRef>
+          <a:effectRef idx="0">
+            <a:schemeClr val="accent1"/>
+          </a:effectRef>
+          <a:fontRef idx="minor">
+            <a:schemeClr val="lt1"/>
+          </a:fontRef>
+        </p:style>
+        <p:txBody>
+          <a:bodyPr rtlCol="0" anchor="ctr"/>
+          <a:lstStyle/>
+          <a:p>
+            <a:pPr algn="ctr"/>
+            <a:endParaRPr lang="en-US"/>
+          </a:p>
+        </p:txBody>
+      </p:sp>
+      <p:sp>
+        <p:nvSpPr>
+          <p:cNvPr id="12" name="Rectangle: Rounded Corners 11">
+            <a:extLst>
+              <a:ext uri="{FF2B5EF4-FFF2-40B4-BE49-F238E27FC236}">
+                <a16:creationId xmlns:a16="http://schemas.microsoft.com/office/drawing/2014/main" id="{6DAB1AD9-D021-EBE2-73CF-62D0F8C40CE8}"/>
+              </a:ext>
+            </a:extLst>
+          </p:cNvPr>
+          <p:cNvSpPr/>
+          <p:nvPr/>
+        </p:nvSpPr>
+        <p:spPr>
+          <a:xfrm>
+            <a:off x="5075259" y="2870200"/>
+            <a:ext cx="1141392" cy="190500"/>
+          </a:xfrm>
+          <a:prstGeom prst="roundRect">
+            <a:avLst/>
+          </a:prstGeom>
+          <a:noFill/>
+          <a:ln w="28575">
+            <a:solidFill>
+              <a:srgbClr val="FFC000"/>
+            </a:solidFill>
+          </a:ln>
+        </p:spPr>
+        <p:style>
+          <a:lnRef idx="2">
+            <a:schemeClr val="accent1">
+              <a:shade val="15000"/>
+            </a:schemeClr>
+          </a:lnRef>
+          <a:fillRef idx="1">
+            <a:schemeClr val="accent1"/>
+          </a:fillRef>
+          <a:effectRef idx="0">
+            <a:schemeClr val="accent1"/>
+          </a:effectRef>
+          <a:fontRef idx="minor">
+            <a:schemeClr val="lt1"/>
+          </a:fontRef>
+        </p:style>
+        <p:txBody>
+          <a:bodyPr rtlCol="0" anchor="ctr"/>
+          <a:lstStyle/>
+          <a:p>
+            <a:pPr algn="ctr"/>
+            <a:endParaRPr lang="en-US"/>
+          </a:p>
+        </p:txBody>
+      </p:sp>
+    </p:spTree>
+    <p:extLst>
+      <p:ext uri="{BB962C8B-B14F-4D97-AF65-F5344CB8AC3E}">
+        <p14:creationId xmlns:p14="http://schemas.microsoft.com/office/powerpoint/2010/main" val="2908035817"/>
+      </p:ext>
+    </p:extLst>
+  </p:cSld>
+  <p:clrMapOvr>
+    <a:masterClrMapping/>
+  </p:clrMapOvr>
+</p:sld>
+</file>
+
+<file path=ppt/slides/slide11.xml><?xml version="1.0" encoding="utf-8"?>
+<p:sld xmlns:a="http://schemas.openxmlformats.org/drawingml/2006/main" xmlns:r="http://schemas.openxmlformats.org/officeDocument/2006/relationships" xmlns:p="http://schemas.openxmlformats.org/presentationml/2006/main">
+  <p:cSld>
+    <p:spTree>
+      <p:nvGrpSpPr>
+        <p:cNvPr id="1" name=""/>
+        <p:cNvGrpSpPr/>
+        <p:nvPr/>
+      </p:nvGrpSpPr>
+      <p:grpSpPr>
+        <a:xfrm>
+          <a:off x="0" y="0"/>
+          <a:ext cx="0" cy="0"/>
+          <a:chOff x="0" y="0"/>
+          <a:chExt cx="0" cy="0"/>
+        </a:xfrm>
+      </p:grpSpPr>
+      <p:sp>
+        <p:nvSpPr>
+          <p:cNvPr id="2" name="Title 1">
+            <a:extLst>
+              <a:ext uri="{FF2B5EF4-FFF2-40B4-BE49-F238E27FC236}">
+                <a16:creationId xmlns:a16="http://schemas.microsoft.com/office/drawing/2014/main" id="{106886CA-8C99-908B-7636-73CB9158C292}"/>
+              </a:ext>
+            </a:extLst>
+          </p:cNvPr>
+          <p:cNvSpPr>
+            <a:spLocks noGrp="1"/>
+          </p:cNvSpPr>
+          <p:nvPr>
+            <p:ph type="title"/>
+          </p:nvPr>
+        </p:nvSpPr>
+        <p:spPr/>
+        <p:txBody>
+          <a:bodyPr/>
+          <a:lstStyle/>
+          <a:p>
+            <a:r>
+              <a:rPr lang="sv-SE" dirty="0"/>
+              <a:t>Process</a:t>
+            </a:r>
+            <a:endParaRPr lang="en-US" dirty="0"/>
+          </a:p>
+        </p:txBody>
+      </p:sp>
+      <p:sp>
+        <p:nvSpPr>
+          <p:cNvPr id="3" name="Content Placeholder 2">
+            <a:extLst>
+              <a:ext uri="{FF2B5EF4-FFF2-40B4-BE49-F238E27FC236}">
+                <a16:creationId xmlns:a16="http://schemas.microsoft.com/office/drawing/2014/main" id="{73C700F8-9BE8-6A10-3874-AB370FF4247A}"/>
+              </a:ext>
+            </a:extLst>
+          </p:cNvPr>
+          <p:cNvSpPr>
+            <a:spLocks noGrp="1"/>
+          </p:cNvSpPr>
+          <p:nvPr>
+            <p:ph idx="1"/>
+          </p:nvPr>
+        </p:nvSpPr>
+        <p:spPr>
+          <a:xfrm>
+            <a:off x="838200" y="1825625"/>
             <a:ext cx="10515600" cy="1164318"/>
           </a:xfrm>
         </p:spPr>
@@ -4301,7 +4681,7 @@
           <a:p>
             <a:fld id="{87D4ACF0-553C-49B0-BBA6-EA2ECC95E3DB}" type="datetime1">
               <a:rPr lang="de-DE" smtClean="0"/>
-              <a:t>20.06.2024</a:t>
+              <a:t>24.06.2024</a:t>
             </a:fld>
             <a:endParaRPr lang="en-US"/>
           </a:p>
@@ -4330,7 +4710,7 @@
           <a:p>
             <a:fld id="{8CCD81E8-6E22-4792-904F-C3E1A440A2A0}" type="slidenum">
               <a:rPr lang="en-US" smtClean="0"/>
-              <a:t>10</a:t>
+              <a:t>11</a:t>
             </a:fld>
             <a:endParaRPr lang="en-US"/>
           </a:p>
@@ -4920,10 +5300,415 @@
   <p:clrMapOvr>
     <a:masterClrMapping/>
   </p:clrMapOvr>
+  <p:timing>
+    <p:tnLst>
+      <p:par>
+        <p:cTn id="1" dur="indefinite" restart="never" nodeType="tmRoot">
+          <p:childTnLst>
+            <p:seq concurrent="1" nextAc="seek">
+              <p:cTn id="2" dur="indefinite" nodeType="mainSeq">
+                <p:childTnLst>
+                  <p:par>
+                    <p:cTn id="3" fill="hold">
+                      <p:stCondLst>
+                        <p:cond delay="indefinite"/>
+                      </p:stCondLst>
+                      <p:childTnLst>
+                        <p:par>
+                          <p:cTn id="4" fill="hold">
+                            <p:stCondLst>
+                              <p:cond delay="0"/>
+                            </p:stCondLst>
+                            <p:childTnLst>
+                              <p:par>
+                                <p:cTn id="5" presetID="1" presetClass="entr" presetSubtype="0" fill="hold" nodeType="clickEffect">
+                                  <p:stCondLst>
+                                    <p:cond delay="0"/>
+                                  </p:stCondLst>
+                                  <p:childTnLst>
+                                    <p:set>
+                                      <p:cBhvr>
+                                        <p:cTn id="6" dur="1" fill="hold">
+                                          <p:stCondLst>
+                                            <p:cond delay="0"/>
+                                          </p:stCondLst>
+                                        </p:cTn>
+                                        <p:tgtEl>
+                                          <p:spTgt spid="14"/>
+                                        </p:tgtEl>
+                                        <p:attrNameLst>
+                                          <p:attrName>style.visibility</p:attrName>
+                                        </p:attrNameLst>
+                                      </p:cBhvr>
+                                      <p:to>
+                                        <p:strVal val="visible"/>
+                                      </p:to>
+                                    </p:set>
+                                  </p:childTnLst>
+                                </p:cTn>
+                              </p:par>
+                              <p:par>
+                                <p:cTn id="7" presetID="1" presetClass="entr" presetSubtype="0" fill="hold" grpId="0" nodeType="withEffect">
+                                  <p:stCondLst>
+                                    <p:cond delay="0"/>
+                                  </p:stCondLst>
+                                  <p:childTnLst>
+                                    <p:set>
+                                      <p:cBhvr>
+                                        <p:cTn id="8" dur="1" fill="hold">
+                                          <p:stCondLst>
+                                            <p:cond delay="0"/>
+                                          </p:stCondLst>
+                                        </p:cTn>
+                                        <p:tgtEl>
+                                          <p:spTgt spid="12"/>
+                                        </p:tgtEl>
+                                        <p:attrNameLst>
+                                          <p:attrName>style.visibility</p:attrName>
+                                        </p:attrNameLst>
+                                      </p:cBhvr>
+                                      <p:to>
+                                        <p:strVal val="visible"/>
+                                      </p:to>
+                                    </p:set>
+                                  </p:childTnLst>
+                                </p:cTn>
+                              </p:par>
+                              <p:par>
+                                <p:cTn id="9" presetID="1" presetClass="entr" presetSubtype="0" fill="hold" nodeType="withEffect">
+                                  <p:stCondLst>
+                                    <p:cond delay="0"/>
+                                  </p:stCondLst>
+                                  <p:childTnLst>
+                                    <p:set>
+                                      <p:cBhvr>
+                                        <p:cTn id="10" dur="1" fill="hold">
+                                          <p:stCondLst>
+                                            <p:cond delay="0"/>
+                                          </p:stCondLst>
+                                        </p:cTn>
+                                        <p:tgtEl>
+                                          <p:spTgt spid="10"/>
+                                        </p:tgtEl>
+                                        <p:attrNameLst>
+                                          <p:attrName>style.visibility</p:attrName>
+                                        </p:attrNameLst>
+                                      </p:cBhvr>
+                                      <p:to>
+                                        <p:strVal val="visible"/>
+                                      </p:to>
+                                    </p:set>
+                                  </p:childTnLst>
+                                </p:cTn>
+                              </p:par>
+                            </p:childTnLst>
+                          </p:cTn>
+                        </p:par>
+                      </p:childTnLst>
+                    </p:cTn>
+                  </p:par>
+                  <p:par>
+                    <p:cTn id="11" fill="hold">
+                      <p:stCondLst>
+                        <p:cond delay="indefinite"/>
+                      </p:stCondLst>
+                      <p:childTnLst>
+                        <p:par>
+                          <p:cTn id="12" fill="hold">
+                            <p:stCondLst>
+                              <p:cond delay="0"/>
+                            </p:stCondLst>
+                            <p:childTnLst>
+                              <p:par>
+                                <p:cTn id="13" presetID="1" presetClass="entr" presetSubtype="0" fill="hold" grpId="0" nodeType="clickEffect">
+                                  <p:stCondLst>
+                                    <p:cond delay="0"/>
+                                  </p:stCondLst>
+                                  <p:childTnLst>
+                                    <p:set>
+                                      <p:cBhvr>
+                                        <p:cTn id="14" dur="1" fill="hold">
+                                          <p:stCondLst>
+                                            <p:cond delay="0"/>
+                                          </p:stCondLst>
+                                        </p:cTn>
+                                        <p:tgtEl>
+                                          <p:spTgt spid="25"/>
+                                        </p:tgtEl>
+                                        <p:attrNameLst>
+                                          <p:attrName>style.visibility</p:attrName>
+                                        </p:attrNameLst>
+                                      </p:cBhvr>
+                                      <p:to>
+                                        <p:strVal val="visible"/>
+                                      </p:to>
+                                    </p:set>
+                                  </p:childTnLst>
+                                </p:cTn>
+                              </p:par>
+                              <p:par>
+                                <p:cTn id="15" presetID="1" presetClass="entr" presetSubtype="0" fill="hold" nodeType="withEffect">
+                                  <p:stCondLst>
+                                    <p:cond delay="0"/>
+                                  </p:stCondLst>
+                                  <p:childTnLst>
+                                    <p:set>
+                                      <p:cBhvr>
+                                        <p:cTn id="16" dur="1" fill="hold">
+                                          <p:stCondLst>
+                                            <p:cond delay="0"/>
+                                          </p:stCondLst>
+                                        </p:cTn>
+                                        <p:tgtEl>
+                                          <p:spTgt spid="17"/>
+                                        </p:tgtEl>
+                                        <p:attrNameLst>
+                                          <p:attrName>style.visibility</p:attrName>
+                                        </p:attrNameLst>
+                                      </p:cBhvr>
+                                      <p:to>
+                                        <p:strVal val="visible"/>
+                                      </p:to>
+                                    </p:set>
+                                  </p:childTnLst>
+                                </p:cTn>
+                              </p:par>
+                              <p:par>
+                                <p:cTn id="17" presetID="1" presetClass="entr" presetSubtype="0" fill="hold" nodeType="withEffect">
+                                  <p:stCondLst>
+                                    <p:cond delay="0"/>
+                                  </p:stCondLst>
+                                  <p:childTnLst>
+                                    <p:set>
+                                      <p:cBhvr>
+                                        <p:cTn id="18" dur="1" fill="hold">
+                                          <p:stCondLst>
+                                            <p:cond delay="0"/>
+                                          </p:stCondLst>
+                                        </p:cTn>
+                                        <p:tgtEl>
+                                          <p:spTgt spid="20"/>
+                                        </p:tgtEl>
+                                        <p:attrNameLst>
+                                          <p:attrName>style.visibility</p:attrName>
+                                        </p:attrNameLst>
+                                      </p:cBhvr>
+                                      <p:to>
+                                        <p:strVal val="visible"/>
+                                      </p:to>
+                                    </p:set>
+                                  </p:childTnLst>
+                                </p:cTn>
+                              </p:par>
+                            </p:childTnLst>
+                          </p:cTn>
+                        </p:par>
+                      </p:childTnLst>
+                    </p:cTn>
+                  </p:par>
+                  <p:par>
+                    <p:cTn id="19" fill="hold">
+                      <p:stCondLst>
+                        <p:cond delay="indefinite"/>
+                      </p:stCondLst>
+                      <p:childTnLst>
+                        <p:par>
+                          <p:cTn id="20" fill="hold">
+                            <p:stCondLst>
+                              <p:cond delay="0"/>
+                            </p:stCondLst>
+                            <p:childTnLst>
+                              <p:par>
+                                <p:cTn id="21" presetID="1" presetClass="entr" presetSubtype="0" fill="hold" nodeType="clickEffect">
+                                  <p:stCondLst>
+                                    <p:cond delay="0"/>
+                                  </p:stCondLst>
+                                  <p:childTnLst>
+                                    <p:set>
+                                      <p:cBhvr>
+                                        <p:cTn id="22" dur="1" fill="hold">
+                                          <p:stCondLst>
+                                            <p:cond delay="0"/>
+                                          </p:stCondLst>
+                                        </p:cTn>
+                                        <p:tgtEl>
+                                          <p:spTgt spid="34"/>
+                                        </p:tgtEl>
+                                        <p:attrNameLst>
+                                          <p:attrName>style.visibility</p:attrName>
+                                        </p:attrNameLst>
+                                      </p:cBhvr>
+                                      <p:to>
+                                        <p:strVal val="visible"/>
+                                      </p:to>
+                                    </p:set>
+                                  </p:childTnLst>
+                                </p:cTn>
+                              </p:par>
+                              <p:par>
+                                <p:cTn id="23" presetID="1" presetClass="entr" presetSubtype="0" fill="hold" nodeType="withEffect">
+                                  <p:stCondLst>
+                                    <p:cond delay="0"/>
+                                  </p:stCondLst>
+                                  <p:childTnLst>
+                                    <p:set>
+                                      <p:cBhvr>
+                                        <p:cTn id="24" dur="1" fill="hold">
+                                          <p:stCondLst>
+                                            <p:cond delay="0"/>
+                                          </p:stCondLst>
+                                        </p:cTn>
+                                        <p:tgtEl>
+                                          <p:spTgt spid="32"/>
+                                        </p:tgtEl>
+                                        <p:attrNameLst>
+                                          <p:attrName>style.visibility</p:attrName>
+                                        </p:attrNameLst>
+                                      </p:cBhvr>
+                                      <p:to>
+                                        <p:strVal val="visible"/>
+                                      </p:to>
+                                    </p:set>
+                                  </p:childTnLst>
+                                </p:cTn>
+                              </p:par>
+                              <p:par>
+                                <p:cTn id="25" presetID="1" presetClass="entr" presetSubtype="0" fill="hold" grpId="0" nodeType="withEffect">
+                                  <p:stCondLst>
+                                    <p:cond delay="0"/>
+                                  </p:stCondLst>
+                                  <p:childTnLst>
+                                    <p:set>
+                                      <p:cBhvr>
+                                        <p:cTn id="26" dur="1" fill="hold">
+                                          <p:stCondLst>
+                                            <p:cond delay="0"/>
+                                          </p:stCondLst>
+                                        </p:cTn>
+                                        <p:tgtEl>
+                                          <p:spTgt spid="33"/>
+                                        </p:tgtEl>
+                                        <p:attrNameLst>
+                                          <p:attrName>style.visibility</p:attrName>
+                                        </p:attrNameLst>
+                                      </p:cBhvr>
+                                      <p:to>
+                                        <p:strVal val="visible"/>
+                                      </p:to>
+                                    </p:set>
+                                  </p:childTnLst>
+                                </p:cTn>
+                              </p:par>
+                            </p:childTnLst>
+                          </p:cTn>
+                        </p:par>
+                      </p:childTnLst>
+                    </p:cTn>
+                  </p:par>
+                  <p:par>
+                    <p:cTn id="27" fill="hold">
+                      <p:stCondLst>
+                        <p:cond delay="indefinite"/>
+                      </p:stCondLst>
+                      <p:childTnLst>
+                        <p:par>
+                          <p:cTn id="28" fill="hold">
+                            <p:stCondLst>
+                              <p:cond delay="0"/>
+                            </p:stCondLst>
+                            <p:childTnLst>
+                              <p:par>
+                                <p:cTn id="29" presetID="1" presetClass="entr" presetSubtype="0" fill="hold" nodeType="clickEffect">
+                                  <p:stCondLst>
+                                    <p:cond delay="0"/>
+                                  </p:stCondLst>
+                                  <p:childTnLst>
+                                    <p:set>
+                                      <p:cBhvr>
+                                        <p:cTn id="30" dur="1" fill="hold">
+                                          <p:stCondLst>
+                                            <p:cond delay="0"/>
+                                          </p:stCondLst>
+                                        </p:cTn>
+                                        <p:tgtEl>
+                                          <p:spTgt spid="27"/>
+                                        </p:tgtEl>
+                                        <p:attrNameLst>
+                                          <p:attrName>style.visibility</p:attrName>
+                                        </p:attrNameLst>
+                                      </p:cBhvr>
+                                      <p:to>
+                                        <p:strVal val="visible"/>
+                                      </p:to>
+                                    </p:set>
+                                  </p:childTnLst>
+                                </p:cTn>
+                              </p:par>
+                              <p:par>
+                                <p:cTn id="31" presetID="1" presetClass="entr" presetSubtype="0" fill="hold" grpId="0" nodeType="withEffect">
+                                  <p:stCondLst>
+                                    <p:cond delay="0"/>
+                                  </p:stCondLst>
+                                  <p:childTnLst>
+                                    <p:set>
+                                      <p:cBhvr>
+                                        <p:cTn id="32" dur="1" fill="hold">
+                                          <p:stCondLst>
+                                            <p:cond delay="0"/>
+                                          </p:stCondLst>
+                                        </p:cTn>
+                                        <p:tgtEl>
+                                          <p:spTgt spid="26"/>
+                                        </p:tgtEl>
+                                        <p:attrNameLst>
+                                          <p:attrName>style.visibility</p:attrName>
+                                        </p:attrNameLst>
+                                      </p:cBhvr>
+                                      <p:to>
+                                        <p:strVal val="visible"/>
+                                      </p:to>
+                                    </p:set>
+                                  </p:childTnLst>
+                                </p:cTn>
+                              </p:par>
+                            </p:childTnLst>
+                          </p:cTn>
+                        </p:par>
+                      </p:childTnLst>
+                    </p:cTn>
+                  </p:par>
+                </p:childTnLst>
+              </p:cTn>
+              <p:prevCondLst>
+                <p:cond evt="onPrev" delay="0">
+                  <p:tgtEl>
+                    <p:sldTgt/>
+                  </p:tgtEl>
+                </p:cond>
+              </p:prevCondLst>
+              <p:nextCondLst>
+                <p:cond evt="onNext" delay="0">
+                  <p:tgtEl>
+                    <p:sldTgt/>
+                  </p:tgtEl>
+                </p:cond>
+              </p:nextCondLst>
+            </p:seq>
+          </p:childTnLst>
+        </p:cTn>
+      </p:par>
+    </p:tnLst>
+    <p:bldLst>
+      <p:bldP spid="12" grpId="0" animBg="1"/>
+      <p:bldP spid="25" grpId="0"/>
+      <p:bldP spid="26" grpId="0" animBg="1"/>
+      <p:bldP spid="33" grpId="0" animBg="1"/>
+    </p:bldLst>
+  </p:timing>
 </p:sld>
 </file>
 
-<file path=ppt/slides/slide11.xml><?xml version="1.0" encoding="utf-8"?>
+<file path=ppt/slides/slide12.xml><?xml version="1.0" encoding="utf-8"?>
 <p:sld xmlns:a="http://schemas.openxmlformats.org/drawingml/2006/main" xmlns:r="http://schemas.openxmlformats.org/officeDocument/2006/relationships" xmlns:p="http://schemas.openxmlformats.org/presentationml/2006/main">
   <p:cSld>
     <p:spTree>
@@ -5028,7 +5813,7 @@
           <a:p>
             <a:fld id="{87D4ACF0-553C-49B0-BBA6-EA2ECC95E3DB}" type="datetime1">
               <a:rPr lang="de-DE" smtClean="0"/>
-              <a:t>20.06.2024</a:t>
+              <a:t>24.06.2024</a:t>
             </a:fld>
             <a:endParaRPr lang="en-US"/>
           </a:p>
@@ -5085,7 +5870,7 @@
           <a:p>
             <a:fld id="{8CCD81E8-6E22-4792-904F-C3E1A440A2A0}" type="slidenum">
               <a:rPr lang="en-US" smtClean="0"/>
-              <a:t>11</a:t>
+              <a:t>12</a:t>
             </a:fld>
             <a:endParaRPr lang="en-US"/>
           </a:p>
@@ -5937,347 +6722,6 @@
   <p:clrMapOvr>
     <a:masterClrMapping/>
   </p:clrMapOvr>
-</p:sld>
-</file>
-
-<file path=ppt/slides/slide12.xml><?xml version="1.0" encoding="utf-8"?>
-<p:sld xmlns:a="http://schemas.openxmlformats.org/drawingml/2006/main" xmlns:r="http://schemas.openxmlformats.org/officeDocument/2006/relationships" xmlns:p="http://schemas.openxmlformats.org/presentationml/2006/main">
-  <p:cSld>
-    <p:spTree>
-      <p:nvGrpSpPr>
-        <p:cNvPr id="1" name=""/>
-        <p:cNvGrpSpPr/>
-        <p:nvPr/>
-      </p:nvGrpSpPr>
-      <p:grpSpPr>
-        <a:xfrm>
-          <a:off x="0" y="0"/>
-          <a:ext cx="0" cy="0"/>
-          <a:chOff x="0" y="0"/>
-          <a:chExt cx="0" cy="0"/>
-        </a:xfrm>
-      </p:grpSpPr>
-      <p:sp>
-        <p:nvSpPr>
-          <p:cNvPr id="2" name="Title 1">
-            <a:extLst>
-              <a:ext uri="{FF2B5EF4-FFF2-40B4-BE49-F238E27FC236}">
-                <a16:creationId xmlns:a16="http://schemas.microsoft.com/office/drawing/2014/main" id="{90AB3A83-AD7F-D9BF-FBA2-6E5A9A931FD6}"/>
-              </a:ext>
-            </a:extLst>
-          </p:cNvPr>
-          <p:cNvSpPr>
-            <a:spLocks noGrp="1"/>
-          </p:cNvSpPr>
-          <p:nvPr>
-            <p:ph type="title"/>
-          </p:nvPr>
-        </p:nvSpPr>
-        <p:spPr/>
-        <p:txBody>
-          <a:bodyPr/>
-          <a:lstStyle/>
-          <a:p>
-            <a:r>
-              <a:rPr lang="sv-SE" dirty="0"/>
-              <a:t>Process</a:t>
-            </a:r>
-            <a:endParaRPr lang="en-US" dirty="0"/>
-          </a:p>
-        </p:txBody>
-      </p:sp>
-      <p:sp>
-        <p:nvSpPr>
-          <p:cNvPr id="3" name="Content Placeholder 2">
-            <a:extLst>
-              <a:ext uri="{FF2B5EF4-FFF2-40B4-BE49-F238E27FC236}">
-                <a16:creationId xmlns:a16="http://schemas.microsoft.com/office/drawing/2014/main" id="{25441802-319C-308A-D911-52177066CF7A}"/>
-              </a:ext>
-            </a:extLst>
-          </p:cNvPr>
-          <p:cNvSpPr>
-            <a:spLocks noGrp="1"/>
-          </p:cNvSpPr>
-          <p:nvPr>
-            <p:ph idx="1"/>
-          </p:nvPr>
-        </p:nvSpPr>
-        <p:spPr/>
-        <p:txBody>
-          <a:bodyPr>
-            <a:normAutofit fontScale="92500" lnSpcReduction="10000"/>
-          </a:bodyPr>
-          <a:lstStyle/>
-          <a:p>
-            <a:pPr marL="514350" indent="-514350">
-              <a:buFont typeface="+mj-lt"/>
-              <a:buAutoNum type="arabicPeriod"/>
-            </a:pPr>
-            <a:r>
-              <a:rPr lang="en-US" b="1" dirty="0"/>
-              <a:t>Fork</a:t>
-            </a:r>
-            <a:r>
-              <a:rPr lang="en-US" dirty="0"/>
-              <a:t> the repository </a:t>
-            </a:r>
-            <a:r>
-              <a:rPr lang="en-US" dirty="0">
-                <a:hlinkClick r:id="rId2"/>
-              </a:rPr>
-              <a:t>https://github.com/aire-ws/aire24-activity</a:t>
-            </a:r>
-            <a:r>
-              <a:rPr lang="en-US" dirty="0"/>
-              <a:t> </a:t>
-            </a:r>
-          </a:p>
-          <a:p>
-            <a:pPr marL="514350" indent="-514350">
-              <a:buFont typeface="+mj-lt"/>
-              <a:buAutoNum type="arabicPeriod"/>
-            </a:pPr>
-            <a:r>
-              <a:rPr lang="en-US" b="1" dirty="0"/>
-              <a:t>Select a study </a:t>
-            </a:r>
-            <a:r>
-              <a:rPr lang="en-US" dirty="0"/>
-              <a:t>presenting a tool</a:t>
-            </a:r>
-          </a:p>
-          <a:p>
-            <a:pPr marL="971550" lvl="1" indent="-514350">
-              <a:buFont typeface="+mj-lt"/>
-              <a:buAutoNum type="arabicPeriod"/>
-            </a:pPr>
-            <a:r>
-              <a:rPr lang="en-US" dirty="0"/>
-              <a:t>When selecting an unfamiliar, prepared tool from the repository (under </a:t>
-            </a:r>
-            <a:r>
-              <a:rPr lang="en-US" i="1" dirty="0"/>
-              <a:t>studies/</a:t>
-            </a:r>
-            <a:r>
-              <a:rPr lang="en-US" dirty="0"/>
-              <a:t>): </a:t>
-            </a:r>
-            <a:r>
-              <a:rPr lang="en-US" b="1" dirty="0"/>
-              <a:t>read the summary</a:t>
-            </a:r>
-            <a:r>
-              <a:rPr lang="en-US" dirty="0"/>
-              <a:t> of its use case in the respective </a:t>
-            </a:r>
-            <a:r>
-              <a:rPr lang="en-US" i="1" dirty="0"/>
-              <a:t>README.md </a:t>
-            </a:r>
-            <a:r>
-              <a:rPr lang="en-US" dirty="0"/>
-              <a:t>file.</a:t>
-            </a:r>
-          </a:p>
-          <a:p>
-            <a:pPr marL="971550" lvl="1" indent="-514350">
-              <a:buFont typeface="+mj-lt"/>
-              <a:buAutoNum type="arabicPeriod"/>
-            </a:pPr>
-            <a:r>
-              <a:rPr lang="en-US" dirty="0"/>
-              <a:t>When selecting an own tool: </a:t>
-            </a:r>
-            <a:r>
-              <a:rPr lang="en-US" b="1" dirty="0"/>
-              <a:t>copy</a:t>
-            </a:r>
-            <a:r>
-              <a:rPr lang="en-US" dirty="0"/>
-              <a:t> the </a:t>
-            </a:r>
-            <a:r>
-              <a:rPr lang="en-US" i="1" dirty="0"/>
-              <a:t>template/</a:t>
-            </a:r>
-            <a:r>
-              <a:rPr lang="en-US" dirty="0"/>
-              <a:t> directory under </a:t>
-            </a:r>
-            <a:r>
-              <a:rPr lang="en-US" i="1" dirty="0"/>
-              <a:t>studies/</a:t>
-            </a:r>
-            <a:r>
-              <a:rPr lang="en-US" dirty="0"/>
-              <a:t> and name it after your study</a:t>
-            </a:r>
-          </a:p>
-          <a:p>
-            <a:pPr marL="514350" indent="-514350">
-              <a:buFont typeface="+mj-lt"/>
-              <a:buAutoNum type="arabicPeriod"/>
-            </a:pPr>
-            <a:r>
-              <a:rPr lang="en-US" b="1" dirty="0"/>
-              <a:t>Select an LLM </a:t>
-            </a:r>
-            <a:r>
-              <a:rPr lang="en-US" dirty="0"/>
-              <a:t>and enter the name and version to the </a:t>
-            </a:r>
-            <a:r>
-              <a:rPr lang="en-US" i="1" dirty="0"/>
-              <a:t>activity-report.md</a:t>
-            </a:r>
-          </a:p>
-          <a:p>
-            <a:pPr marL="514350" indent="-514350">
-              <a:buFont typeface="+mj-lt"/>
-              <a:buAutoNum type="arabicPeriod"/>
-            </a:pPr>
-            <a:r>
-              <a:rPr lang="en-US" b="1" dirty="0"/>
-              <a:t>Develop a prompt </a:t>
-            </a:r>
-            <a:r>
-              <a:rPr lang="en-US" dirty="0"/>
-              <a:t>that performs the tool’s task with the input data in the </a:t>
-            </a:r>
-            <a:r>
-              <a:rPr lang="en-US" i="1" dirty="0"/>
-              <a:t>data.md </a:t>
-            </a:r>
-            <a:r>
-              <a:rPr lang="en-US" dirty="0"/>
-              <a:t>file and </a:t>
-            </a:r>
-            <a:r>
-              <a:rPr lang="en-US" b="1" dirty="0"/>
-              <a:t>report your prompt </a:t>
-            </a:r>
-            <a:r>
-              <a:rPr lang="en-US" dirty="0"/>
-              <a:t>in the </a:t>
-            </a:r>
-            <a:r>
-              <a:rPr lang="en-US" i="1" dirty="0"/>
-              <a:t>activity-report.md</a:t>
-            </a:r>
-          </a:p>
-          <a:p>
-            <a:pPr marL="514350" indent="-514350">
-              <a:buFont typeface="+mj-lt"/>
-              <a:buAutoNum type="arabicPeriod"/>
-            </a:pPr>
-            <a:r>
-              <a:rPr lang="en-US" b="1" dirty="0"/>
-              <a:t>Reflect</a:t>
-            </a:r>
-            <a:r>
-              <a:rPr lang="en-US" dirty="0"/>
-              <a:t> on the LLM’s performance</a:t>
-            </a:r>
-          </a:p>
-        </p:txBody>
-      </p:sp>
-      <p:sp>
-        <p:nvSpPr>
-          <p:cNvPr id="4" name="Date Placeholder 3">
-            <a:extLst>
-              <a:ext uri="{FF2B5EF4-FFF2-40B4-BE49-F238E27FC236}">
-                <a16:creationId xmlns:a16="http://schemas.microsoft.com/office/drawing/2014/main" id="{D750075F-7430-1234-393A-B76453A88B00}"/>
-              </a:ext>
-            </a:extLst>
-          </p:cNvPr>
-          <p:cNvSpPr>
-            <a:spLocks noGrp="1"/>
-          </p:cNvSpPr>
-          <p:nvPr>
-            <p:ph type="dt" sz="half" idx="10"/>
-          </p:nvPr>
-        </p:nvSpPr>
-        <p:spPr/>
-        <p:txBody>
-          <a:bodyPr/>
-          <a:lstStyle/>
-          <a:p>
-            <a:fld id="{A46BBE92-60BD-46EA-B79F-8DB35CFC3275}" type="datetime1">
-              <a:rPr lang="de-DE" smtClean="0"/>
-              <a:t>20.06.2024</a:t>
-            </a:fld>
-            <a:endParaRPr lang="en-US"/>
-          </a:p>
-        </p:txBody>
-      </p:sp>
-      <p:sp>
-        <p:nvSpPr>
-          <p:cNvPr id="5" name="Footer Placeholder 4">
-            <a:extLst>
-              <a:ext uri="{FF2B5EF4-FFF2-40B4-BE49-F238E27FC236}">
-                <a16:creationId xmlns:a16="http://schemas.microsoft.com/office/drawing/2014/main" id="{9C422975-BD42-C771-9A1C-3C40D99AAA00}"/>
-              </a:ext>
-            </a:extLst>
-          </p:cNvPr>
-          <p:cNvSpPr>
-            <a:spLocks noGrp="1"/>
-          </p:cNvSpPr>
-          <p:nvPr>
-            <p:ph type="ftr" sz="quarter" idx="11"/>
-          </p:nvPr>
-        </p:nvSpPr>
-        <p:spPr/>
-        <p:txBody>
-          <a:bodyPr/>
-          <a:lstStyle/>
-          <a:p>
-            <a:r>
-              <a:rPr lang="en-US"/>
-              <a:t>AIRE'24</a:t>
-            </a:r>
-          </a:p>
-        </p:txBody>
-      </p:sp>
-      <p:sp>
-        <p:nvSpPr>
-          <p:cNvPr id="6" name="Slide Number Placeholder 5">
-            <a:extLst>
-              <a:ext uri="{FF2B5EF4-FFF2-40B4-BE49-F238E27FC236}">
-                <a16:creationId xmlns:a16="http://schemas.microsoft.com/office/drawing/2014/main" id="{AE8186C2-5D56-BF05-7E4D-001DB432DA50}"/>
-              </a:ext>
-            </a:extLst>
-          </p:cNvPr>
-          <p:cNvSpPr>
-            <a:spLocks noGrp="1"/>
-          </p:cNvSpPr>
-          <p:nvPr>
-            <p:ph type="sldNum" sz="quarter" idx="12"/>
-          </p:nvPr>
-        </p:nvSpPr>
-        <p:spPr/>
-        <p:txBody>
-          <a:bodyPr/>
-          <a:lstStyle/>
-          <a:p>
-            <a:fld id="{8CCD81E8-6E22-4792-904F-C3E1A440A2A0}" type="slidenum">
-              <a:rPr lang="en-US" smtClean="0"/>
-              <a:t>12</a:t>
-            </a:fld>
-            <a:endParaRPr lang="en-US"/>
-          </a:p>
-        </p:txBody>
-      </p:sp>
-    </p:spTree>
-    <p:extLst>
-      <p:ext uri="{BB962C8B-B14F-4D97-AF65-F5344CB8AC3E}">
-        <p14:creationId xmlns:p14="http://schemas.microsoft.com/office/powerpoint/2010/main" val="3720242288"/>
-      </p:ext>
-    </p:extLst>
-  </p:cSld>
-  <p:clrMapOvr>
-    <a:masterClrMapping/>
-  </p:clrMapOvr>
   <p:timing>
     <p:tnLst>
       <p:par>
@@ -6299,7 +6743,7 @@
                             </p:stCondLst>
                             <p:childTnLst>
                               <p:par>
-                                <p:cTn id="5" presetID="1" presetClass="entr" presetSubtype="0" fill="hold" nodeType="clickEffect">
+                                <p:cTn id="5" presetID="1" presetClass="entr" presetSubtype="0" fill="hold" grpId="0" nodeType="clickEffect">
                                   <p:stCondLst>
                                     <p:cond delay="0"/>
                                   </p:stCondLst>
@@ -6312,11 +6756,7 @@
                                           </p:stCondLst>
                                         </p:cTn>
                                         <p:tgtEl>
-                                          <p:spTgt spid="3">
-                                            <p:txEl>
-                                              <p:pRg st="0" end="0"/>
-                                            </p:txEl>
-                                          </p:spTgt>
+                                          <p:spTgt spid="10"/>
                                         </p:tgtEl>
                                         <p:attrNameLst>
                                           <p:attrName>style.visibility</p:attrName>
@@ -6329,26 +6769,35 @@
                                   </p:childTnLst>
                                 </p:cTn>
                               </p:par>
-                            </p:childTnLst>
-                          </p:cTn>
-                        </p:par>
-                      </p:childTnLst>
-                    </p:cTn>
-                  </p:par>
-                  <p:par>
-                    <p:cTn id="7" fill="hold">
-                      <p:stCondLst>
-                        <p:cond delay="indefinite"/>
-                      </p:stCondLst>
-                      <p:childTnLst>
-                        <p:par>
-                          <p:cTn id="8" fill="hold">
-                            <p:stCondLst>
-                              <p:cond delay="0"/>
-                            </p:stCondLst>
-                            <p:childTnLst>
                               <p:par>
-                                <p:cTn id="9" presetID="1" presetClass="entr" presetSubtype="0" fill="hold" nodeType="clickEffect">
+                                <p:cTn id="7" presetID="1" presetClass="entr" presetSubtype="0" fill="hold" grpId="0" nodeType="withEffect">
+                                  <p:stCondLst>
+                                    <p:cond delay="0"/>
+                                  </p:stCondLst>
+                                  <p:childTnLst>
+                                    <p:set>
+                                      <p:cBhvr>
+                                        <p:cTn id="8" dur="1" fill="hold">
+                                          <p:stCondLst>
+                                            <p:cond delay="0"/>
+                                          </p:stCondLst>
+                                        </p:cTn>
+                                        <p:tgtEl>
+                                          <p:spTgt spid="8"/>
+                                        </p:tgtEl>
+                                        <p:attrNameLst>
+                                          <p:attrName>style.visibility</p:attrName>
+                                        </p:attrNameLst>
+                                      </p:cBhvr>
+                                      <p:to>
+                                        <p:strVal val="visible"/>
+                                      </p:to>
+                                    </p:set>
+                                  </p:childTnLst>
+                                </p:cTn>
+                              </p:par>
+                              <p:par>
+                                <p:cTn id="9" presetID="1" presetClass="entr" presetSubtype="0" fill="hold" nodeType="withEffect">
                                   <p:stCondLst>
                                     <p:cond delay="0"/>
                                   </p:stCondLst>
@@ -6361,11 +6810,7 @@
                                           </p:stCondLst>
                                         </p:cTn>
                                         <p:tgtEl>
-                                          <p:spTgt spid="3">
-                                            <p:txEl>
-                                              <p:pRg st="1" end="1"/>
-                                            </p:txEl>
-                                          </p:spTgt>
+                                          <p:spTgt spid="20"/>
                                         </p:tgtEl>
                                         <p:attrNameLst>
                                           <p:attrName>style.visibility</p:attrName>
@@ -6378,26 +6823,35 @@
                                   </p:childTnLst>
                                 </p:cTn>
                               </p:par>
-                            </p:childTnLst>
-                          </p:cTn>
-                        </p:par>
-                      </p:childTnLst>
-                    </p:cTn>
-                  </p:par>
-                  <p:par>
-                    <p:cTn id="11" fill="hold">
-                      <p:stCondLst>
-                        <p:cond delay="indefinite"/>
-                      </p:stCondLst>
-                      <p:childTnLst>
-                        <p:par>
-                          <p:cTn id="12" fill="hold">
-                            <p:stCondLst>
-                              <p:cond delay="0"/>
-                            </p:stCondLst>
-                            <p:childTnLst>
                               <p:par>
-                                <p:cTn id="13" presetID="1" presetClass="entr" presetSubtype="0" fill="hold" nodeType="clickEffect">
+                                <p:cTn id="11" presetID="1" presetClass="entr" presetSubtype="0" fill="hold" grpId="0" nodeType="withEffect">
+                                  <p:stCondLst>
+                                    <p:cond delay="0"/>
+                                  </p:stCondLst>
+                                  <p:childTnLst>
+                                    <p:set>
+                                      <p:cBhvr>
+                                        <p:cTn id="12" dur="1" fill="hold">
+                                          <p:stCondLst>
+                                            <p:cond delay="0"/>
+                                          </p:stCondLst>
+                                        </p:cTn>
+                                        <p:tgtEl>
+                                          <p:spTgt spid="35"/>
+                                        </p:tgtEl>
+                                        <p:attrNameLst>
+                                          <p:attrName>style.visibility</p:attrName>
+                                        </p:attrNameLst>
+                                      </p:cBhvr>
+                                      <p:to>
+                                        <p:strVal val="visible"/>
+                                      </p:to>
+                                    </p:set>
+                                  </p:childTnLst>
+                                </p:cTn>
+                              </p:par>
+                              <p:par>
+                                <p:cTn id="13" presetID="1" presetClass="entr" presetSubtype="0" fill="hold" nodeType="withEffect">
                                   <p:stCondLst>
                                     <p:cond delay="0"/>
                                   </p:stCondLst>
@@ -6410,11 +6864,7 @@
                                           </p:stCondLst>
                                         </p:cTn>
                                         <p:tgtEl>
-                                          <p:spTgt spid="3">
-                                            <p:txEl>
-                                              <p:pRg st="2" end="2"/>
-                                            </p:txEl>
-                                          </p:spTgt>
+                                          <p:spTgt spid="19"/>
                                         </p:tgtEl>
                                         <p:attrNameLst>
                                           <p:attrName>style.visibility</p:attrName>
@@ -6446,7 +6896,7 @@
                             </p:stCondLst>
                             <p:childTnLst>
                               <p:par>
-                                <p:cTn id="17" presetID="1" presetClass="entr" presetSubtype="0" fill="hold" nodeType="clickEffect">
+                                <p:cTn id="17" presetID="1" presetClass="entr" presetSubtype="0" fill="hold" grpId="0" nodeType="clickEffect">
                                   <p:stCondLst>
                                     <p:cond delay="0"/>
                                   </p:stCondLst>
@@ -6459,11 +6909,7 @@
                                           </p:stCondLst>
                                         </p:cTn>
                                         <p:tgtEl>
-                                          <p:spTgt spid="3">
-                                            <p:txEl>
-                                              <p:pRg st="3" end="3"/>
-                                            </p:txEl>
-                                          </p:spTgt>
+                                          <p:spTgt spid="9"/>
                                         </p:tgtEl>
                                         <p:attrNameLst>
                                           <p:attrName>style.visibility</p:attrName>
@@ -6476,26 +6922,35 @@
                                   </p:childTnLst>
                                 </p:cTn>
                               </p:par>
-                            </p:childTnLst>
-                          </p:cTn>
-                        </p:par>
-                      </p:childTnLst>
-                    </p:cTn>
-                  </p:par>
-                  <p:par>
-                    <p:cTn id="19" fill="hold">
-                      <p:stCondLst>
-                        <p:cond delay="indefinite"/>
-                      </p:stCondLst>
-                      <p:childTnLst>
-                        <p:par>
-                          <p:cTn id="20" fill="hold">
-                            <p:stCondLst>
-                              <p:cond delay="0"/>
-                            </p:stCondLst>
-                            <p:childTnLst>
                               <p:par>
-                                <p:cTn id="21" presetID="1" presetClass="entr" presetSubtype="0" fill="hold" nodeType="clickEffect">
+                                <p:cTn id="19" presetID="1" presetClass="entr" presetSubtype="0" fill="hold" nodeType="withEffect">
+                                  <p:stCondLst>
+                                    <p:cond delay="0"/>
+                                  </p:stCondLst>
+                                  <p:childTnLst>
+                                    <p:set>
+                                      <p:cBhvr>
+                                        <p:cTn id="20" dur="1" fill="hold">
+                                          <p:stCondLst>
+                                            <p:cond delay="0"/>
+                                          </p:stCondLst>
+                                        </p:cTn>
+                                        <p:tgtEl>
+                                          <p:spTgt spid="31"/>
+                                        </p:tgtEl>
+                                        <p:attrNameLst>
+                                          <p:attrName>style.visibility</p:attrName>
+                                        </p:attrNameLst>
+                                      </p:cBhvr>
+                                      <p:to>
+                                        <p:strVal val="visible"/>
+                                      </p:to>
+                                    </p:set>
+                                  </p:childTnLst>
+                                </p:cTn>
+                              </p:par>
+                              <p:par>
+                                <p:cTn id="21" presetID="1" presetClass="entr" presetSubtype="0" fill="hold" grpId="0" nodeType="withEffect">
                                   <p:stCondLst>
                                     <p:cond delay="0"/>
                                   </p:stCondLst>
@@ -6508,11 +6963,7 @@
                                           </p:stCondLst>
                                         </p:cTn>
                                         <p:tgtEl>
-                                          <p:spTgt spid="3">
-                                            <p:txEl>
-                                              <p:pRg st="4" end="4"/>
-                                            </p:txEl>
-                                          </p:spTgt>
+                                          <p:spTgt spid="36"/>
                                         </p:tgtEl>
                                         <p:attrNameLst>
                                           <p:attrName>style.visibility</p:attrName>
@@ -6525,92 +6976,21 @@
                                   </p:childTnLst>
                                 </p:cTn>
                               </p:par>
-                            </p:childTnLst>
-                          </p:cTn>
-                        </p:par>
-                      </p:childTnLst>
-                    </p:cTn>
-                  </p:par>
-                  <p:par>
-                    <p:cTn id="23" fill="hold">
-                      <p:stCondLst>
-                        <p:cond delay="indefinite"/>
-                      </p:stCondLst>
-                      <p:childTnLst>
-                        <p:par>
-                          <p:cTn id="24" fill="hold">
-                            <p:stCondLst>
-                              <p:cond delay="0"/>
-                            </p:stCondLst>
-                            <p:childTnLst>
                               <p:par>
-                                <p:cTn id="25" presetID="1" presetClass="entr" presetSubtype="0" fill="hold" nodeType="clickEffect">
+                                <p:cTn id="23" presetID="1" presetClass="entr" presetSubtype="0" fill="hold" nodeType="withEffect">
                                   <p:stCondLst>
                                     <p:cond delay="0"/>
                                   </p:stCondLst>
                                   <p:childTnLst>
                                     <p:set>
                                       <p:cBhvr>
-                                        <p:cTn id="26" dur="1" fill="hold">
+                                        <p:cTn id="24" dur="1" fill="hold">
                                           <p:stCondLst>
                                             <p:cond delay="0"/>
                                           </p:stCondLst>
                                         </p:cTn>
                                         <p:tgtEl>
-                                          <p:spTgt spid="3">
-                                            <p:txEl>
-                                              <p:pRg st="5" end="5"/>
-                                            </p:txEl>
-                                          </p:spTgt>
-                                        </p:tgtEl>
-                                        <p:attrNameLst>
-                                          <p:attrName>style.visibility</p:attrName>
-                                        </p:attrNameLst>
-                                      </p:cBhvr>
-                                      <p:to>
-                                        <p:strVal val="visible"/>
-                                      </p:to>
-                                    </p:set>
-                                  </p:childTnLst>
-                                </p:cTn>
-                              </p:par>
-                            </p:childTnLst>
-                          </p:cTn>
-                        </p:par>
-                      </p:childTnLst>
-                    </p:cTn>
-                  </p:par>
-                  <p:par>
-                    <p:cTn id="27" fill="hold">
-                      <p:stCondLst>
-                        <p:cond delay="indefinite"/>
-                      </p:stCondLst>
-                      <p:childTnLst>
-                        <p:par>
-                          <p:cTn id="28" fill="hold">
-                            <p:stCondLst>
-                              <p:cond delay="0"/>
-                            </p:stCondLst>
-                            <p:childTnLst>
-                              <p:par>
-                                <p:cTn id="29" presetID="1" presetClass="entr" presetSubtype="0" fill="hold" nodeType="clickEffect">
-                                  <p:stCondLst>
-                                    <p:cond delay="0"/>
-                                  </p:stCondLst>
-                                  <p:childTnLst>
-                                    <p:set>
-                                      <p:cBhvr>
-                                        <p:cTn id="30" dur="1" fill="hold">
-                                          <p:stCondLst>
-                                            <p:cond delay="0"/>
-                                          </p:stCondLst>
-                                        </p:cTn>
-                                        <p:tgtEl>
-                                          <p:spTgt spid="3">
-                                            <p:txEl>
-                                              <p:pRg st="6" end="6"/>
-                                            </p:txEl>
-                                          </p:spTgt>
+                                          <p:spTgt spid="37"/>
                                         </p:tgtEl>
                                         <p:attrNameLst>
                                           <p:attrName>style.visibility</p:attrName>
@@ -6650,11 +7030,359 @@
         </p:cTn>
       </p:par>
     </p:tnLst>
+    <p:bldLst>
+      <p:bldP spid="8" grpId="0" animBg="1"/>
+      <p:bldP spid="9" grpId="0" animBg="1"/>
+      <p:bldP spid="10" grpId="0" animBg="1"/>
+      <p:bldP spid="35" grpId="0"/>
+      <p:bldP spid="36" grpId="0"/>
+    </p:bldLst>
   </p:timing>
 </p:sld>
 </file>
 
 <file path=ppt/slides/slide13.xml><?xml version="1.0" encoding="utf-8"?>
+<p:sld xmlns:a="http://schemas.openxmlformats.org/drawingml/2006/main" xmlns:r="http://schemas.openxmlformats.org/officeDocument/2006/relationships" xmlns:p="http://schemas.openxmlformats.org/presentationml/2006/main">
+  <p:cSld>
+    <p:spTree>
+      <p:nvGrpSpPr>
+        <p:cNvPr id="1" name=""/>
+        <p:cNvGrpSpPr/>
+        <p:nvPr/>
+      </p:nvGrpSpPr>
+      <p:grpSpPr>
+        <a:xfrm>
+          <a:off x="0" y="0"/>
+          <a:ext cx="0" cy="0"/>
+          <a:chOff x="0" y="0"/>
+          <a:chExt cx="0" cy="0"/>
+        </a:xfrm>
+      </p:grpSpPr>
+      <p:sp>
+        <p:nvSpPr>
+          <p:cNvPr id="2" name="Title 1">
+            <a:extLst>
+              <a:ext uri="{FF2B5EF4-FFF2-40B4-BE49-F238E27FC236}">
+                <a16:creationId xmlns:a16="http://schemas.microsoft.com/office/drawing/2014/main" id="{90AB3A83-AD7F-D9BF-FBA2-6E5A9A931FD6}"/>
+              </a:ext>
+            </a:extLst>
+          </p:cNvPr>
+          <p:cNvSpPr>
+            <a:spLocks noGrp="1"/>
+          </p:cNvSpPr>
+          <p:nvPr>
+            <p:ph type="title"/>
+          </p:nvPr>
+        </p:nvSpPr>
+        <p:spPr/>
+        <p:txBody>
+          <a:bodyPr/>
+          <a:lstStyle/>
+          <a:p>
+            <a:r>
+              <a:rPr lang="sv-SE" dirty="0"/>
+              <a:t>Process</a:t>
+            </a:r>
+            <a:endParaRPr lang="en-US" dirty="0"/>
+          </a:p>
+        </p:txBody>
+      </p:sp>
+      <p:sp>
+        <p:nvSpPr>
+          <p:cNvPr id="3" name="Content Placeholder 2">
+            <a:extLst>
+              <a:ext uri="{FF2B5EF4-FFF2-40B4-BE49-F238E27FC236}">
+                <a16:creationId xmlns:a16="http://schemas.microsoft.com/office/drawing/2014/main" id="{25441802-319C-308A-D911-52177066CF7A}"/>
+              </a:ext>
+            </a:extLst>
+          </p:cNvPr>
+          <p:cNvSpPr>
+            <a:spLocks noGrp="1"/>
+          </p:cNvSpPr>
+          <p:nvPr>
+            <p:ph idx="1"/>
+          </p:nvPr>
+        </p:nvSpPr>
+        <p:spPr/>
+        <p:txBody>
+          <a:bodyPr>
+            <a:normAutofit fontScale="92500" lnSpcReduction="10000"/>
+          </a:bodyPr>
+          <a:lstStyle/>
+          <a:p>
+            <a:pPr marL="514350" indent="-514350">
+              <a:buFont typeface="+mj-lt"/>
+              <a:buAutoNum type="arabicPeriod"/>
+            </a:pPr>
+            <a:r>
+              <a:rPr lang="en-US" b="1" dirty="0"/>
+              <a:t>Fork</a:t>
+            </a:r>
+            <a:r>
+              <a:rPr lang="en-US" dirty="0"/>
+              <a:t> the repository </a:t>
+            </a:r>
+            <a:r>
+              <a:rPr lang="en-US" dirty="0">
+                <a:hlinkClick r:id="rId2"/>
+              </a:rPr>
+              <a:t>https://github.com/aire-ws/aire24-activity</a:t>
+            </a:r>
+            <a:r>
+              <a:rPr lang="en-US" dirty="0"/>
+              <a:t> </a:t>
+            </a:r>
+          </a:p>
+          <a:p>
+            <a:pPr marL="514350" indent="-514350">
+              <a:buFont typeface="+mj-lt"/>
+              <a:buAutoNum type="arabicPeriod"/>
+            </a:pPr>
+            <a:r>
+              <a:rPr lang="en-US" b="1" dirty="0"/>
+              <a:t>Select a study </a:t>
+            </a:r>
+            <a:r>
+              <a:rPr lang="en-US" dirty="0"/>
+              <a:t>presenting a tool</a:t>
+            </a:r>
+          </a:p>
+          <a:p>
+            <a:pPr marL="971550" lvl="1" indent="-514350">
+              <a:buFont typeface="+mj-lt"/>
+              <a:buAutoNum type="arabicPeriod"/>
+            </a:pPr>
+            <a:r>
+              <a:rPr lang="en-US" dirty="0"/>
+              <a:t>When selecting an unfamiliar, prepared tool from the repository (under </a:t>
+            </a:r>
+            <a:r>
+              <a:rPr lang="en-US" i="1" dirty="0"/>
+              <a:t>studies/</a:t>
+            </a:r>
+            <a:r>
+              <a:rPr lang="en-US" dirty="0"/>
+              <a:t>): </a:t>
+            </a:r>
+            <a:r>
+              <a:rPr lang="en-US" b="1" dirty="0"/>
+              <a:t>read the summary</a:t>
+            </a:r>
+            <a:r>
+              <a:rPr lang="en-US" dirty="0"/>
+              <a:t> of its use case in the respective </a:t>
+            </a:r>
+            <a:r>
+              <a:rPr lang="en-US" i="1" dirty="0"/>
+              <a:t>README.md </a:t>
+            </a:r>
+            <a:r>
+              <a:rPr lang="en-US" dirty="0"/>
+              <a:t>file.</a:t>
+            </a:r>
+          </a:p>
+          <a:p>
+            <a:pPr marL="971550" lvl="1" indent="-514350">
+              <a:buFont typeface="+mj-lt"/>
+              <a:buAutoNum type="arabicPeriod"/>
+            </a:pPr>
+            <a:r>
+              <a:rPr lang="en-US" dirty="0"/>
+              <a:t>When selecting an own tool: </a:t>
+            </a:r>
+            <a:r>
+              <a:rPr lang="en-US" b="1" dirty="0"/>
+              <a:t>copy</a:t>
+            </a:r>
+            <a:r>
+              <a:rPr lang="en-US" dirty="0"/>
+              <a:t> the </a:t>
+            </a:r>
+            <a:r>
+              <a:rPr lang="en-US" i="1" dirty="0"/>
+              <a:t>template/</a:t>
+            </a:r>
+            <a:r>
+              <a:rPr lang="en-US" dirty="0"/>
+              <a:t> directory under </a:t>
+            </a:r>
+            <a:r>
+              <a:rPr lang="en-US" i="1" dirty="0"/>
+              <a:t>studies/</a:t>
+            </a:r>
+            <a:r>
+              <a:rPr lang="en-US" dirty="0"/>
+              <a:t> and name it after your study</a:t>
+            </a:r>
+          </a:p>
+          <a:p>
+            <a:pPr marL="514350" indent="-514350">
+              <a:buFont typeface="+mj-lt"/>
+              <a:buAutoNum type="arabicPeriod"/>
+            </a:pPr>
+            <a:r>
+              <a:rPr lang="en-US" b="1" dirty="0"/>
+              <a:t>Select an LLM </a:t>
+            </a:r>
+            <a:r>
+              <a:rPr lang="en-US" dirty="0"/>
+              <a:t>and enter the name and version to the </a:t>
+            </a:r>
+            <a:r>
+              <a:rPr lang="en-US" i="1" dirty="0"/>
+              <a:t>activity-report.md</a:t>
+            </a:r>
+          </a:p>
+          <a:p>
+            <a:pPr marL="514350" indent="-514350">
+              <a:buFont typeface="+mj-lt"/>
+              <a:buAutoNum type="arabicPeriod"/>
+            </a:pPr>
+            <a:r>
+              <a:rPr lang="en-US" b="1" dirty="0"/>
+              <a:t>Develop a prompt </a:t>
+            </a:r>
+            <a:r>
+              <a:rPr lang="en-US" dirty="0"/>
+              <a:t>that performs the tool’s task with the input data in the </a:t>
+            </a:r>
+            <a:r>
+              <a:rPr lang="en-US" i="1" dirty="0"/>
+              <a:t>data.md </a:t>
+            </a:r>
+            <a:r>
+              <a:rPr lang="en-US" dirty="0"/>
+              <a:t>file and </a:t>
+            </a:r>
+            <a:r>
+              <a:rPr lang="en-US" b="1" dirty="0"/>
+              <a:t>report your prompt </a:t>
+            </a:r>
+            <a:r>
+              <a:rPr lang="en-US" dirty="0"/>
+              <a:t>in the </a:t>
+            </a:r>
+            <a:r>
+              <a:rPr lang="en-US" i="1" dirty="0"/>
+              <a:t>activity-report.md</a:t>
+            </a:r>
+          </a:p>
+          <a:p>
+            <a:pPr marL="514350" indent="-514350">
+              <a:buFont typeface="+mj-lt"/>
+              <a:buAutoNum type="arabicPeriod"/>
+            </a:pPr>
+            <a:r>
+              <a:rPr lang="en-US" b="1" dirty="0"/>
+              <a:t>Reflect</a:t>
+            </a:r>
+            <a:r>
+              <a:rPr lang="en-US" dirty="0"/>
+              <a:t> on the LLM’s performance</a:t>
+            </a:r>
+          </a:p>
+        </p:txBody>
+      </p:sp>
+      <p:sp>
+        <p:nvSpPr>
+          <p:cNvPr id="4" name="Date Placeholder 3">
+            <a:extLst>
+              <a:ext uri="{FF2B5EF4-FFF2-40B4-BE49-F238E27FC236}">
+                <a16:creationId xmlns:a16="http://schemas.microsoft.com/office/drawing/2014/main" id="{D750075F-7430-1234-393A-B76453A88B00}"/>
+              </a:ext>
+            </a:extLst>
+          </p:cNvPr>
+          <p:cNvSpPr>
+            <a:spLocks noGrp="1"/>
+          </p:cNvSpPr>
+          <p:nvPr>
+            <p:ph type="dt" sz="half" idx="10"/>
+          </p:nvPr>
+        </p:nvSpPr>
+        <p:spPr/>
+        <p:txBody>
+          <a:bodyPr/>
+          <a:lstStyle/>
+          <a:p>
+            <a:fld id="{A46BBE92-60BD-46EA-B79F-8DB35CFC3275}" type="datetime1">
+              <a:rPr lang="de-DE" smtClean="0"/>
+              <a:t>24.06.2024</a:t>
+            </a:fld>
+            <a:endParaRPr lang="en-US"/>
+          </a:p>
+        </p:txBody>
+      </p:sp>
+      <p:sp>
+        <p:nvSpPr>
+          <p:cNvPr id="5" name="Footer Placeholder 4">
+            <a:extLst>
+              <a:ext uri="{FF2B5EF4-FFF2-40B4-BE49-F238E27FC236}">
+                <a16:creationId xmlns:a16="http://schemas.microsoft.com/office/drawing/2014/main" id="{9C422975-BD42-C771-9A1C-3C40D99AAA00}"/>
+              </a:ext>
+            </a:extLst>
+          </p:cNvPr>
+          <p:cNvSpPr>
+            <a:spLocks noGrp="1"/>
+          </p:cNvSpPr>
+          <p:nvPr>
+            <p:ph type="ftr" sz="quarter" idx="11"/>
+          </p:nvPr>
+        </p:nvSpPr>
+        <p:spPr/>
+        <p:txBody>
+          <a:bodyPr/>
+          <a:lstStyle/>
+          <a:p>
+            <a:r>
+              <a:rPr lang="en-US"/>
+              <a:t>AIRE'24</a:t>
+            </a:r>
+          </a:p>
+        </p:txBody>
+      </p:sp>
+      <p:sp>
+        <p:nvSpPr>
+          <p:cNvPr id="6" name="Slide Number Placeholder 5">
+            <a:extLst>
+              <a:ext uri="{FF2B5EF4-FFF2-40B4-BE49-F238E27FC236}">
+                <a16:creationId xmlns:a16="http://schemas.microsoft.com/office/drawing/2014/main" id="{AE8186C2-5D56-BF05-7E4D-001DB432DA50}"/>
+              </a:ext>
+            </a:extLst>
+          </p:cNvPr>
+          <p:cNvSpPr>
+            <a:spLocks noGrp="1"/>
+          </p:cNvSpPr>
+          <p:nvPr>
+            <p:ph type="sldNum" sz="quarter" idx="12"/>
+          </p:nvPr>
+        </p:nvSpPr>
+        <p:spPr/>
+        <p:txBody>
+          <a:bodyPr/>
+          <a:lstStyle/>
+          <a:p>
+            <a:fld id="{8CCD81E8-6E22-4792-904F-C3E1A440A2A0}" type="slidenum">
+              <a:rPr lang="en-US" smtClean="0"/>
+              <a:t>13</a:t>
+            </a:fld>
+            <a:endParaRPr lang="en-US"/>
+          </a:p>
+        </p:txBody>
+      </p:sp>
+    </p:spTree>
+    <p:extLst>
+      <p:ext uri="{BB962C8B-B14F-4D97-AF65-F5344CB8AC3E}">
+        <p14:creationId xmlns:p14="http://schemas.microsoft.com/office/powerpoint/2010/main" val="3720242288"/>
+      </p:ext>
+    </p:extLst>
+  </p:cSld>
+  <p:clrMapOvr>
+    <a:masterClrMapping/>
+  </p:clrMapOvr>
+</p:sld>
+</file>
+
+<file path=ppt/slides/slide14.xml><?xml version="1.0" encoding="utf-8"?>
 <p:sld xmlns:a="http://schemas.openxmlformats.org/drawingml/2006/main" xmlns:r="http://schemas.openxmlformats.org/officeDocument/2006/relationships" xmlns:p="http://schemas.openxmlformats.org/presentationml/2006/main" show="0">
   <p:cSld>
     <p:spTree>
@@ -6898,7 +7626,7 @@
             <a:fld id="{C0D0ADDD-D36D-4CA7-A3ED-3D8ADCF8DFA8}" type="slidenum">
               <a:rPr lang="en-US" smtClean="0"/>
               <a:pPr/>
-              <a:t>13</a:t>
+              <a:t>14</a:t>
             </a:fld>
             <a:endParaRPr lang="en-US"/>
           </a:p>
@@ -7183,7 +7911,7 @@
           <a:p>
             <a:fld id="{6B5ABEF6-F7C2-425D-9A4E-6A621EC451F1}" type="datetime1">
               <a:rPr lang="de-DE" smtClean="0"/>
-              <a:t>20.06.2024</a:t>
+              <a:t>24.06.2024</a:t>
             </a:fld>
             <a:endParaRPr lang="en-US"/>
           </a:p>
@@ -7212,7 +7940,7 @@
           <a:p>
             <a:fld id="{8CCD81E8-6E22-4792-904F-C3E1A440A2A0}" type="slidenum">
               <a:rPr lang="en-US" smtClean="0"/>
-              <a:t>13</a:t>
+              <a:t>14</a:t>
             </a:fld>
             <a:endParaRPr lang="en-US"/>
           </a:p>
@@ -7222,193 +7950,6 @@
     <p:extLst>
       <p:ext uri="{BB962C8B-B14F-4D97-AF65-F5344CB8AC3E}">
         <p14:creationId xmlns:p14="http://schemas.microsoft.com/office/powerpoint/2010/main" val="700251608"/>
-      </p:ext>
-    </p:extLst>
-  </p:cSld>
-  <p:clrMapOvr>
-    <a:masterClrMapping/>
-  </p:clrMapOvr>
-</p:sld>
-</file>
-
-<file path=ppt/slides/slide14.xml><?xml version="1.0" encoding="utf-8"?>
-<p:sld xmlns:a="http://schemas.openxmlformats.org/drawingml/2006/main" xmlns:r="http://schemas.openxmlformats.org/officeDocument/2006/relationships" xmlns:p="http://schemas.openxmlformats.org/presentationml/2006/main">
-  <p:cSld>
-    <p:spTree>
-      <p:nvGrpSpPr>
-        <p:cNvPr id="1" name=""/>
-        <p:cNvGrpSpPr/>
-        <p:nvPr/>
-      </p:nvGrpSpPr>
-      <p:grpSpPr>
-        <a:xfrm>
-          <a:off x="0" y="0"/>
-          <a:ext cx="0" cy="0"/>
-          <a:chOff x="0" y="0"/>
-          <a:chExt cx="0" cy="0"/>
-        </a:xfrm>
-      </p:grpSpPr>
-      <p:sp>
-        <p:nvSpPr>
-          <p:cNvPr id="2" name="Title 1">
-            <a:extLst>
-              <a:ext uri="{FF2B5EF4-FFF2-40B4-BE49-F238E27FC236}">
-                <a16:creationId xmlns:a16="http://schemas.microsoft.com/office/drawing/2014/main" id="{748B1A73-E77A-2501-B1C5-EE7F64F209FD}"/>
-              </a:ext>
-            </a:extLst>
-          </p:cNvPr>
-          <p:cNvSpPr>
-            <a:spLocks noGrp="1"/>
-          </p:cNvSpPr>
-          <p:nvPr>
-            <p:ph type="title"/>
-          </p:nvPr>
-        </p:nvSpPr>
-        <p:spPr/>
-        <p:txBody>
-          <a:bodyPr/>
-          <a:lstStyle/>
-          <a:p>
-            <a:r>
-              <a:rPr lang="en-US" dirty="0"/>
-              <a:t>Discussion</a:t>
-            </a:r>
-          </a:p>
-        </p:txBody>
-      </p:sp>
-      <p:sp>
-        <p:nvSpPr>
-          <p:cNvPr id="3" name="Content Placeholder 2">
-            <a:extLst>
-              <a:ext uri="{FF2B5EF4-FFF2-40B4-BE49-F238E27FC236}">
-                <a16:creationId xmlns:a16="http://schemas.microsoft.com/office/drawing/2014/main" id="{91FF4952-A899-A69E-874E-CA63D3E89F06}"/>
-              </a:ext>
-            </a:extLst>
-          </p:cNvPr>
-          <p:cNvSpPr>
-            <a:spLocks noGrp="1"/>
-          </p:cNvSpPr>
-          <p:nvPr>
-            <p:ph idx="1"/>
-          </p:nvPr>
-        </p:nvSpPr>
-        <p:spPr/>
-        <p:txBody>
-          <a:bodyPr/>
-          <a:lstStyle/>
-          <a:p>
-            <a:pPr marL="0" indent="0">
-              <a:buNone/>
-            </a:pPr>
-            <a:r>
-              <a:rPr lang="en-US" dirty="0"/>
-              <a:t>Have large-language models made previous AI tools obsolete?</a:t>
-            </a:r>
-          </a:p>
-          <a:p>
-            <a:r>
-              <a:rPr lang="en-US" dirty="0"/>
-              <a:t>What were the strengths of the LLM?</a:t>
-            </a:r>
-          </a:p>
-          <a:p>
-            <a:r>
-              <a:rPr lang="en-US" dirty="0"/>
-              <a:t>What were the weaknesses of the LLM?</a:t>
-            </a:r>
-          </a:p>
-        </p:txBody>
-      </p:sp>
-      <p:sp>
-        <p:nvSpPr>
-          <p:cNvPr id="4" name="Date Placeholder 3">
-            <a:extLst>
-              <a:ext uri="{FF2B5EF4-FFF2-40B4-BE49-F238E27FC236}">
-                <a16:creationId xmlns:a16="http://schemas.microsoft.com/office/drawing/2014/main" id="{5DBB155F-7D85-CCD4-AE7F-8E743FD731DB}"/>
-              </a:ext>
-            </a:extLst>
-          </p:cNvPr>
-          <p:cNvSpPr>
-            <a:spLocks noGrp="1"/>
-          </p:cNvSpPr>
-          <p:nvPr>
-            <p:ph type="dt" sz="half" idx="10"/>
-          </p:nvPr>
-        </p:nvSpPr>
-        <p:spPr/>
-        <p:txBody>
-          <a:bodyPr/>
-          <a:lstStyle/>
-          <a:p>
-            <a:fld id="{9FF9093E-FD87-48EC-9DFE-E4DC5A8BE70A}" type="datetime1">
-              <a:rPr lang="de-DE" smtClean="0"/>
-              <a:t>20.06.2024</a:t>
-            </a:fld>
-            <a:endParaRPr lang="en-US"/>
-          </a:p>
-        </p:txBody>
-      </p:sp>
-      <p:sp>
-        <p:nvSpPr>
-          <p:cNvPr id="5" name="Footer Placeholder 4">
-            <a:extLst>
-              <a:ext uri="{FF2B5EF4-FFF2-40B4-BE49-F238E27FC236}">
-                <a16:creationId xmlns:a16="http://schemas.microsoft.com/office/drawing/2014/main" id="{04C067DC-455D-1028-5971-BC2C00FE69A7}"/>
-              </a:ext>
-            </a:extLst>
-          </p:cNvPr>
-          <p:cNvSpPr>
-            <a:spLocks noGrp="1"/>
-          </p:cNvSpPr>
-          <p:nvPr>
-            <p:ph type="ftr" sz="quarter" idx="11"/>
-          </p:nvPr>
-        </p:nvSpPr>
-        <p:spPr/>
-        <p:txBody>
-          <a:bodyPr/>
-          <a:lstStyle/>
-          <a:p>
-            <a:r>
-              <a:rPr lang="en-US"/>
-              <a:t>AIRE'24</a:t>
-            </a:r>
-          </a:p>
-        </p:txBody>
-      </p:sp>
-      <p:sp>
-        <p:nvSpPr>
-          <p:cNvPr id="6" name="Slide Number Placeholder 5">
-            <a:extLst>
-              <a:ext uri="{FF2B5EF4-FFF2-40B4-BE49-F238E27FC236}">
-                <a16:creationId xmlns:a16="http://schemas.microsoft.com/office/drawing/2014/main" id="{88EF22CE-1539-178A-41D7-6E4C4577F1E6}"/>
-              </a:ext>
-            </a:extLst>
-          </p:cNvPr>
-          <p:cNvSpPr>
-            <a:spLocks noGrp="1"/>
-          </p:cNvSpPr>
-          <p:nvPr>
-            <p:ph type="sldNum" sz="quarter" idx="12"/>
-          </p:nvPr>
-        </p:nvSpPr>
-        <p:spPr/>
-        <p:txBody>
-          <a:bodyPr/>
-          <a:lstStyle/>
-          <a:p>
-            <a:fld id="{8CCD81E8-6E22-4792-904F-C3E1A440A2A0}" type="slidenum">
-              <a:rPr lang="en-US" smtClean="0"/>
-              <a:t>14</a:t>
-            </a:fld>
-            <a:endParaRPr lang="en-US"/>
-          </a:p>
-        </p:txBody>
-      </p:sp>
-    </p:spTree>
-    <p:extLst>
-      <p:ext uri="{BB962C8B-B14F-4D97-AF65-F5344CB8AC3E}">
-        <p14:creationId xmlns:p14="http://schemas.microsoft.com/office/powerpoint/2010/main" val="822517883"/>
       </p:ext>
     </p:extLst>
   </p:cSld>
@@ -7440,7 +7981,7 @@
           <p:cNvPr id="2" name="Title 1">
             <a:extLst>
               <a:ext uri="{FF2B5EF4-FFF2-40B4-BE49-F238E27FC236}">
-                <a16:creationId xmlns:a16="http://schemas.microsoft.com/office/drawing/2014/main" id="{3913EA6F-3C78-DED9-BC18-130C4D199D75}"/>
+                <a16:creationId xmlns:a16="http://schemas.microsoft.com/office/drawing/2014/main" id="{748B1A73-E77A-2501-B1C5-EE7F64F209FD}"/>
               </a:ext>
             </a:extLst>
           </p:cNvPr>
@@ -7458,7 +7999,7 @@
           <a:p>
             <a:r>
               <a:rPr lang="en-US" dirty="0"/>
-              <a:t>Wrap-Up</a:t>
+              <a:t>Discussion</a:t>
             </a:r>
           </a:p>
         </p:txBody>
@@ -7468,7 +8009,7 @@
           <p:cNvPr id="3" name="Content Placeholder 2">
             <a:extLst>
               <a:ext uri="{FF2B5EF4-FFF2-40B4-BE49-F238E27FC236}">
-                <a16:creationId xmlns:a16="http://schemas.microsoft.com/office/drawing/2014/main" id="{2442E74E-005A-6D79-B866-020652EF9EA0}"/>
+                <a16:creationId xmlns:a16="http://schemas.microsoft.com/office/drawing/2014/main" id="{91FF4952-A899-A69E-874E-CA63D3E89F06}"/>
               </a:ext>
             </a:extLst>
           </p:cNvPr>
@@ -7484,30 +8025,24 @@
           <a:bodyPr/>
           <a:lstStyle/>
           <a:p>
-            <a:pPr marL="514350" indent="-514350">
-              <a:buFont typeface="+mj-lt"/>
-              <a:buAutoNum type="arabicPeriod" startAt="6"/>
-            </a:pPr>
-            <a:r>
-              <a:rPr lang="en-US" b="1" dirty="0"/>
-              <a:t>Push</a:t>
-            </a:r>
-            <a:r>
-              <a:rPr lang="en-US" dirty="0"/>
-              <a:t> your changes back into your forked repository</a:t>
-            </a:r>
-          </a:p>
-          <a:p>
             <a:pPr marL="0" indent="0">
               <a:buNone/>
             </a:pPr>
             <a:r>
               <a:rPr lang="en-US" dirty="0"/>
-              <a:t>… and approach us </a:t>
-            </a:r>
-            <a:r>
-              <a:rPr lang="en-US"/>
-              <a:t>with feedback.</a:t>
+              <a:t>Have large-language models made previous AI tools obsolete?</a:t>
+            </a:r>
+          </a:p>
+          <a:p>
+            <a:r>
+              <a:rPr lang="en-US" dirty="0"/>
+              <a:t>What were the strengths of the LLM?</a:t>
+            </a:r>
+          </a:p>
+          <a:p>
+            <a:r>
+              <a:rPr lang="en-US" dirty="0"/>
+              <a:t>What were the weaknesses of the LLM?</a:t>
             </a:r>
           </a:p>
         </p:txBody>
@@ -7517,7 +8052,7 @@
           <p:cNvPr id="4" name="Date Placeholder 3">
             <a:extLst>
               <a:ext uri="{FF2B5EF4-FFF2-40B4-BE49-F238E27FC236}">
-                <a16:creationId xmlns:a16="http://schemas.microsoft.com/office/drawing/2014/main" id="{4B7C0881-533B-4EB1-B0B2-9CE929C37C83}"/>
+                <a16:creationId xmlns:a16="http://schemas.microsoft.com/office/drawing/2014/main" id="{5DBB155F-7D85-CCD4-AE7F-8E743FD731DB}"/>
               </a:ext>
             </a:extLst>
           </p:cNvPr>
@@ -7533,9 +8068,9 @@
           <a:bodyPr/>
           <a:lstStyle/>
           <a:p>
-            <a:fld id="{87D4ACF0-553C-49B0-BBA6-EA2ECC95E3DB}" type="datetime1">
+            <a:fld id="{9FF9093E-FD87-48EC-9DFE-E4DC5A8BE70A}" type="datetime1">
               <a:rPr lang="de-DE" smtClean="0"/>
-              <a:t>20.06.2024</a:t>
+              <a:t>24.06.2024</a:t>
             </a:fld>
             <a:endParaRPr lang="en-US"/>
           </a:p>
@@ -7546,7 +8081,7 @@
           <p:cNvPr id="5" name="Footer Placeholder 4">
             <a:extLst>
               <a:ext uri="{FF2B5EF4-FFF2-40B4-BE49-F238E27FC236}">
-                <a16:creationId xmlns:a16="http://schemas.microsoft.com/office/drawing/2014/main" id="{3A85A5B8-1BCA-8585-E3EC-CF9AE33768BD}"/>
+                <a16:creationId xmlns:a16="http://schemas.microsoft.com/office/drawing/2014/main" id="{04C067DC-455D-1028-5971-BC2C00FE69A7}"/>
               </a:ext>
             </a:extLst>
           </p:cNvPr>
@@ -7574,7 +8109,7 @@
           <p:cNvPr id="6" name="Slide Number Placeholder 5">
             <a:extLst>
               <a:ext uri="{FF2B5EF4-FFF2-40B4-BE49-F238E27FC236}">
-                <a16:creationId xmlns:a16="http://schemas.microsoft.com/office/drawing/2014/main" id="{D0A62B40-1B7C-7ABB-ED9A-99D9AD49147D}"/>
+                <a16:creationId xmlns:a16="http://schemas.microsoft.com/office/drawing/2014/main" id="{88EF22CE-1539-178A-41D7-6E4C4577F1E6}"/>
               </a:ext>
             </a:extLst>
           </p:cNvPr>
@@ -7593,6 +8128,195 @@
             <a:fld id="{8CCD81E8-6E22-4792-904F-C3E1A440A2A0}" type="slidenum">
               <a:rPr lang="en-US" smtClean="0"/>
               <a:t>15</a:t>
+            </a:fld>
+            <a:endParaRPr lang="en-US"/>
+          </a:p>
+        </p:txBody>
+      </p:sp>
+    </p:spTree>
+    <p:extLst>
+      <p:ext uri="{BB962C8B-B14F-4D97-AF65-F5344CB8AC3E}">
+        <p14:creationId xmlns:p14="http://schemas.microsoft.com/office/powerpoint/2010/main" val="822517883"/>
+      </p:ext>
+    </p:extLst>
+  </p:cSld>
+  <p:clrMapOvr>
+    <a:masterClrMapping/>
+  </p:clrMapOvr>
+</p:sld>
+</file>
+
+<file path=ppt/slides/slide16.xml><?xml version="1.0" encoding="utf-8"?>
+<p:sld xmlns:a="http://schemas.openxmlformats.org/drawingml/2006/main" xmlns:r="http://schemas.openxmlformats.org/officeDocument/2006/relationships" xmlns:p="http://schemas.openxmlformats.org/presentationml/2006/main">
+  <p:cSld>
+    <p:spTree>
+      <p:nvGrpSpPr>
+        <p:cNvPr id="1" name=""/>
+        <p:cNvGrpSpPr/>
+        <p:nvPr/>
+      </p:nvGrpSpPr>
+      <p:grpSpPr>
+        <a:xfrm>
+          <a:off x="0" y="0"/>
+          <a:ext cx="0" cy="0"/>
+          <a:chOff x="0" y="0"/>
+          <a:chExt cx="0" cy="0"/>
+        </a:xfrm>
+      </p:grpSpPr>
+      <p:sp>
+        <p:nvSpPr>
+          <p:cNvPr id="2" name="Title 1">
+            <a:extLst>
+              <a:ext uri="{FF2B5EF4-FFF2-40B4-BE49-F238E27FC236}">
+                <a16:creationId xmlns:a16="http://schemas.microsoft.com/office/drawing/2014/main" id="{3913EA6F-3C78-DED9-BC18-130C4D199D75}"/>
+              </a:ext>
+            </a:extLst>
+          </p:cNvPr>
+          <p:cNvSpPr>
+            <a:spLocks noGrp="1"/>
+          </p:cNvSpPr>
+          <p:nvPr>
+            <p:ph type="title"/>
+          </p:nvPr>
+        </p:nvSpPr>
+        <p:spPr/>
+        <p:txBody>
+          <a:bodyPr/>
+          <a:lstStyle/>
+          <a:p>
+            <a:r>
+              <a:rPr lang="en-US" dirty="0"/>
+              <a:t>Wrap-Up</a:t>
+            </a:r>
+          </a:p>
+        </p:txBody>
+      </p:sp>
+      <p:sp>
+        <p:nvSpPr>
+          <p:cNvPr id="3" name="Content Placeholder 2">
+            <a:extLst>
+              <a:ext uri="{FF2B5EF4-FFF2-40B4-BE49-F238E27FC236}">
+                <a16:creationId xmlns:a16="http://schemas.microsoft.com/office/drawing/2014/main" id="{2442E74E-005A-6D79-B866-020652EF9EA0}"/>
+              </a:ext>
+            </a:extLst>
+          </p:cNvPr>
+          <p:cNvSpPr>
+            <a:spLocks noGrp="1"/>
+          </p:cNvSpPr>
+          <p:nvPr>
+            <p:ph idx="1"/>
+          </p:nvPr>
+        </p:nvSpPr>
+        <p:spPr/>
+        <p:txBody>
+          <a:bodyPr/>
+          <a:lstStyle/>
+          <a:p>
+            <a:pPr marL="514350" indent="-514350">
+              <a:buFont typeface="+mj-lt"/>
+              <a:buAutoNum type="arabicPeriod" startAt="6"/>
+            </a:pPr>
+            <a:r>
+              <a:rPr lang="en-US" b="1" dirty="0"/>
+              <a:t>Push</a:t>
+            </a:r>
+            <a:r>
+              <a:rPr lang="en-US" dirty="0"/>
+              <a:t> your changes back into your forked repository</a:t>
+            </a:r>
+          </a:p>
+          <a:p>
+            <a:pPr marL="0" indent="0">
+              <a:buNone/>
+            </a:pPr>
+            <a:r>
+              <a:rPr lang="en-US" dirty="0"/>
+              <a:t>… and share any feedback that you have.</a:t>
+            </a:r>
+          </a:p>
+        </p:txBody>
+      </p:sp>
+      <p:sp>
+        <p:nvSpPr>
+          <p:cNvPr id="4" name="Date Placeholder 3">
+            <a:extLst>
+              <a:ext uri="{FF2B5EF4-FFF2-40B4-BE49-F238E27FC236}">
+                <a16:creationId xmlns:a16="http://schemas.microsoft.com/office/drawing/2014/main" id="{4B7C0881-533B-4EB1-B0B2-9CE929C37C83}"/>
+              </a:ext>
+            </a:extLst>
+          </p:cNvPr>
+          <p:cNvSpPr>
+            <a:spLocks noGrp="1"/>
+          </p:cNvSpPr>
+          <p:nvPr>
+            <p:ph type="dt" sz="half" idx="10"/>
+          </p:nvPr>
+        </p:nvSpPr>
+        <p:spPr/>
+        <p:txBody>
+          <a:bodyPr/>
+          <a:lstStyle/>
+          <a:p>
+            <a:fld id="{87D4ACF0-553C-49B0-BBA6-EA2ECC95E3DB}" type="datetime1">
+              <a:rPr lang="de-DE" smtClean="0"/>
+              <a:t>24.06.2024</a:t>
+            </a:fld>
+            <a:endParaRPr lang="en-US"/>
+          </a:p>
+        </p:txBody>
+      </p:sp>
+      <p:sp>
+        <p:nvSpPr>
+          <p:cNvPr id="5" name="Footer Placeholder 4">
+            <a:extLst>
+              <a:ext uri="{FF2B5EF4-FFF2-40B4-BE49-F238E27FC236}">
+                <a16:creationId xmlns:a16="http://schemas.microsoft.com/office/drawing/2014/main" id="{3A85A5B8-1BCA-8585-E3EC-CF9AE33768BD}"/>
+              </a:ext>
+            </a:extLst>
+          </p:cNvPr>
+          <p:cNvSpPr>
+            <a:spLocks noGrp="1"/>
+          </p:cNvSpPr>
+          <p:nvPr>
+            <p:ph type="ftr" sz="quarter" idx="11"/>
+          </p:nvPr>
+        </p:nvSpPr>
+        <p:spPr/>
+        <p:txBody>
+          <a:bodyPr/>
+          <a:lstStyle/>
+          <a:p>
+            <a:r>
+              <a:rPr lang="en-US"/>
+              <a:t>AIRE'24</a:t>
+            </a:r>
+          </a:p>
+        </p:txBody>
+      </p:sp>
+      <p:sp>
+        <p:nvSpPr>
+          <p:cNvPr id="6" name="Slide Number Placeholder 5">
+            <a:extLst>
+              <a:ext uri="{FF2B5EF4-FFF2-40B4-BE49-F238E27FC236}">
+                <a16:creationId xmlns:a16="http://schemas.microsoft.com/office/drawing/2014/main" id="{D0A62B40-1B7C-7ABB-ED9A-99D9AD49147D}"/>
+              </a:ext>
+            </a:extLst>
+          </p:cNvPr>
+          <p:cNvSpPr>
+            <a:spLocks noGrp="1"/>
+          </p:cNvSpPr>
+          <p:nvPr>
+            <p:ph type="sldNum" sz="quarter" idx="12"/>
+          </p:nvPr>
+        </p:nvSpPr>
+        <p:spPr/>
+        <p:txBody>
+          <a:bodyPr/>
+          <a:lstStyle/>
+          <a:p>
+            <a:fld id="{8CCD81E8-6E22-4792-904F-C3E1A440A2A0}" type="slidenum">
+              <a:rPr lang="en-US" smtClean="0"/>
+              <a:t>16</a:t>
             </a:fld>
             <a:endParaRPr lang="en-US"/>
           </a:p>
@@ -7611,7 +8335,7 @@
 </p:sld>
 </file>
 
-<file path=ppt/slides/slide16.xml><?xml version="1.0" encoding="utf-8"?>
+<file path=ppt/slides/slide17.xml><?xml version="1.0" encoding="utf-8"?>
 <p:sld xmlns:a="http://schemas.openxmlformats.org/drawingml/2006/main" xmlns:r="http://schemas.openxmlformats.org/officeDocument/2006/relationships" xmlns:p="http://schemas.openxmlformats.org/presentationml/2006/main">
   <p:cSld>
     <p:spTree>
@@ -7949,7 +8673,7 @@
           <a:p>
             <a:fld id="{8C12727B-0358-459E-BAED-F8582AC9F04D}" type="datetime1">
               <a:rPr lang="de-DE" smtClean="0"/>
-              <a:t>20.06.2024</a:t>
+              <a:t>24.06.2024</a:t>
             </a:fld>
             <a:endParaRPr lang="en-US"/>
           </a:p>
@@ -8006,7 +8730,7 @@
           <a:p>
             <a:fld id="{8CCD81E8-6E22-4792-904F-C3E1A440A2A0}" type="slidenum">
               <a:rPr lang="en-US" smtClean="0"/>
-              <a:t>16</a:t>
+              <a:t>17</a:t>
             </a:fld>
             <a:endParaRPr lang="en-US"/>
           </a:p>
@@ -9107,7 +9831,7 @@
           <a:p>
             <a:fld id="{F8A0CD6F-A4D8-4723-9D66-5BE7F7875D78}" type="datetime1">
               <a:rPr lang="de-DE" smtClean="0"/>
-              <a:t>20.06.2024</a:t>
+              <a:t>24.06.2024</a:t>
             </a:fld>
             <a:endParaRPr lang="en-US"/>
           </a:p>
@@ -9756,7 +10480,7 @@
           <a:p>
             <a:fld id="{80E913E7-B6C5-4338-9622-526995614B4B}" type="datetime1">
               <a:rPr lang="de-DE" smtClean="0"/>
-              <a:t>20.06.2024</a:t>
+              <a:t>24.06.2024</a:t>
             </a:fld>
             <a:endParaRPr lang="en-US"/>
           </a:p>
@@ -13234,7 +13958,7 @@
           <a:p>
             <a:fld id="{37A397C2-585F-49AB-A225-30DBF07F82E8}" type="datetime1">
               <a:rPr lang="de-DE" smtClean="0"/>
-              <a:t>20.06.2024</a:t>
+              <a:t>24.06.2024</a:t>
             </a:fld>
             <a:endParaRPr lang="en-US"/>
           </a:p>
@@ -13969,7 +14693,7 @@
           <a:p>
             <a:fld id="{BB8A81F1-6BEB-4E83-B6F2-F03A4A35328D}" type="datetime1">
               <a:rPr lang="de-DE" smtClean="0"/>
-              <a:t>20.06.2024</a:t>
+              <a:t>24.06.2024</a:t>
             </a:fld>
             <a:endParaRPr lang="en-US"/>
           </a:p>
@@ -14039,7 +14763,7 @@
           <p:cNvPr id="2" name="Title 1">
             <a:extLst>
               <a:ext uri="{FF2B5EF4-FFF2-40B4-BE49-F238E27FC236}">
-                <a16:creationId xmlns:a16="http://schemas.microsoft.com/office/drawing/2014/main" id="{13968C42-1848-2BDC-BF07-80C49BCF9881}"/>
+                <a16:creationId xmlns:a16="http://schemas.microsoft.com/office/drawing/2014/main" id="{996D0E5C-C6CD-6717-3834-A76CB039D675}"/>
               </a:ext>
             </a:extLst>
           </p:cNvPr>
@@ -14056,10 +14780,9 @@
           <a:lstStyle/>
           <a:p>
             <a:r>
-              <a:rPr lang="sv-SE" dirty="0"/>
-              <a:t>Process</a:t>
-            </a:r>
-            <a:endParaRPr lang="en-US" dirty="0"/>
+              <a:rPr lang="en-US" dirty="0"/>
+              <a:t>Material available on GitHub</a:t>
+            </a:r>
           </a:p>
         </p:txBody>
       </p:sp>
@@ -14068,7 +14791,7 @@
           <p:cNvPr id="3" name="Content Placeholder 2">
             <a:extLst>
               <a:ext uri="{FF2B5EF4-FFF2-40B4-BE49-F238E27FC236}">
-                <a16:creationId xmlns:a16="http://schemas.microsoft.com/office/drawing/2014/main" id="{A92A6823-03D7-8B26-56C8-0B05A48CE4A9}"/>
+                <a16:creationId xmlns:a16="http://schemas.microsoft.com/office/drawing/2014/main" id="{0BBB945F-759E-85BA-D905-81C7885E37FA}"/>
               </a:ext>
             </a:extLst>
           </p:cNvPr>
@@ -14082,39 +14805,50 @@
         <p:spPr>
           <a:xfrm>
             <a:off x="838200" y="1825625"/>
-            <a:ext cx="10515600" cy="560736"/>
+            <a:ext cx="10515600" cy="1001796"/>
           </a:xfrm>
         </p:spPr>
         <p:txBody>
           <a:bodyPr/>
           <a:lstStyle/>
-          <a:p>
-            <a:pPr marL="514350" indent="-514350">
-              <a:buAutoNum type="arabicPeriod"/>
-            </a:pPr>
-            <a:r>
-              <a:rPr lang="en-US" b="1" dirty="0"/>
-              <a:t>Fork</a:t>
-            </a:r>
-            <a:r>
-              <a:rPr lang="en-US" dirty="0"/>
-              <a:t> the repository </a:t>
-            </a:r>
-            <a:r>
-              <a:rPr lang="en-US" dirty="0">
-                <a:hlinkClick r:id="rId2"/>
-              </a:rPr>
-              <a:t>https://github.com/aire-ws/aire24-activity</a:t>
-            </a:r>
-            <a:r>
-              <a:rPr lang="en-US" dirty="0"/>
-              <a:t> </a:t>
-            </a:r>
-          </a:p>
           <a:p>
             <a:pPr marL="0" indent="0">
               <a:buNone/>
             </a:pPr>
+            <a:r>
+              <a:rPr lang="sv-SE" dirty="0" err="1"/>
+              <a:t>Find</a:t>
+            </a:r>
+            <a:r>
+              <a:rPr lang="sv-SE" dirty="0"/>
+              <a:t> the </a:t>
+            </a:r>
+            <a:r>
+              <a:rPr lang="sv-SE" dirty="0" err="1"/>
+              <a:t>link</a:t>
+            </a:r>
+            <a:r>
+              <a:rPr lang="sv-SE" dirty="0"/>
+              <a:t> to the material on the workshop </a:t>
+            </a:r>
+            <a:r>
+              <a:rPr lang="sv-SE" dirty="0" err="1"/>
+              <a:t>website</a:t>
+            </a:r>
+            <a:r>
+              <a:rPr lang="sv-SE" dirty="0"/>
+              <a:t>: </a:t>
+            </a:r>
+            <a:r>
+              <a:rPr lang="sv-SE" dirty="0">
+                <a:hlinkClick r:id="rId2"/>
+              </a:rPr>
+              <a:t>https://aire-ws.github.io/aire24/program.html</a:t>
+            </a:r>
+            <a:r>
+              <a:rPr lang="sv-SE" dirty="0"/>
+              <a:t> </a:t>
+            </a:r>
             <a:endParaRPr lang="en-US" dirty="0"/>
           </a:p>
         </p:txBody>
@@ -14124,7 +14858,7 @@
           <p:cNvPr id="4" name="Date Placeholder 3">
             <a:extLst>
               <a:ext uri="{FF2B5EF4-FFF2-40B4-BE49-F238E27FC236}">
-                <a16:creationId xmlns:a16="http://schemas.microsoft.com/office/drawing/2014/main" id="{EE65A6DE-DA56-B80E-645D-A63444363F71}"/>
+                <a16:creationId xmlns:a16="http://schemas.microsoft.com/office/drawing/2014/main" id="{B1AFF327-9C21-3258-A73D-EF8E2CA08359}"/>
               </a:ext>
             </a:extLst>
           </p:cNvPr>
@@ -14142,9 +14876,9 @@
           <a:p>
             <a:fld id="{87D4ACF0-553C-49B0-BBA6-EA2ECC95E3DB}" type="datetime1">
               <a:rPr lang="de-DE" smtClean="0"/>
-              <a:t>20.06.2024</a:t>
+              <a:t>24.06.2024</a:t>
             </a:fld>
-            <a:endParaRPr lang="en-US"/>
+            <a:endParaRPr lang="en-US" dirty="0"/>
           </a:p>
         </p:txBody>
       </p:sp>
@@ -14153,7 +14887,7 @@
           <p:cNvPr id="5" name="Footer Placeholder 4">
             <a:extLst>
               <a:ext uri="{FF2B5EF4-FFF2-40B4-BE49-F238E27FC236}">
-                <a16:creationId xmlns:a16="http://schemas.microsoft.com/office/drawing/2014/main" id="{9B10851B-C516-2234-7753-7A3EDACD1BA7}"/>
+                <a16:creationId xmlns:a16="http://schemas.microsoft.com/office/drawing/2014/main" id="{99ACC14C-5BFD-E38F-5A82-4AB32A7F570E}"/>
               </a:ext>
             </a:extLst>
           </p:cNvPr>
@@ -14181,7 +14915,7 @@
           <p:cNvPr id="6" name="Slide Number Placeholder 5">
             <a:extLst>
               <a:ext uri="{FF2B5EF4-FFF2-40B4-BE49-F238E27FC236}">
-                <a16:creationId xmlns:a16="http://schemas.microsoft.com/office/drawing/2014/main" id="{ADBB0FCE-4578-2577-70C7-77AB20E6E8AE}"/>
+                <a16:creationId xmlns:a16="http://schemas.microsoft.com/office/drawing/2014/main" id="{4D779F14-BFA6-1931-1A4B-445B5BD94840}"/>
               </a:ext>
             </a:extLst>
           </p:cNvPr>
@@ -14200,6 +14934,289 @@
             <a:fld id="{8CCD81E8-6E22-4792-904F-C3E1A440A2A0}" type="slidenum">
               <a:rPr lang="en-US" smtClean="0"/>
               <a:t>6</a:t>
+            </a:fld>
+            <a:endParaRPr lang="en-US"/>
+          </a:p>
+        </p:txBody>
+      </p:sp>
+      <p:pic>
+        <p:nvPicPr>
+          <p:cNvPr id="8" name="Picture 7">
+            <a:extLst>
+              <a:ext uri="{FF2B5EF4-FFF2-40B4-BE49-F238E27FC236}">
+                <a16:creationId xmlns:a16="http://schemas.microsoft.com/office/drawing/2014/main" id="{DC2FD3DE-CBB1-3B6D-815D-BC65476D516D}"/>
+              </a:ext>
+            </a:extLst>
+          </p:cNvPr>
+          <p:cNvPicPr>
+            <a:picLocks noChangeAspect="1"/>
+          </p:cNvPicPr>
+          <p:nvPr/>
+        </p:nvPicPr>
+        <p:blipFill>
+          <a:blip r:embed="rId3"/>
+          <a:stretch>
+            <a:fillRect/>
+          </a:stretch>
+        </p:blipFill>
+        <p:spPr>
+          <a:xfrm>
+            <a:off x="2052637" y="3211178"/>
+            <a:ext cx="8086725" cy="2962275"/>
+          </a:xfrm>
+          <a:prstGeom prst="rect">
+            <a:avLst/>
+          </a:prstGeom>
+        </p:spPr>
+      </p:pic>
+      <p:sp>
+        <p:nvSpPr>
+          <p:cNvPr id="9" name="Rectangle: Rounded Corners 8">
+            <a:extLst>
+              <a:ext uri="{FF2B5EF4-FFF2-40B4-BE49-F238E27FC236}">
+                <a16:creationId xmlns:a16="http://schemas.microsoft.com/office/drawing/2014/main" id="{082D96D2-E29E-3A94-4CFD-BE569D7E7E06}"/>
+              </a:ext>
+            </a:extLst>
+          </p:cNvPr>
+          <p:cNvSpPr/>
+          <p:nvPr/>
+        </p:nvSpPr>
+        <p:spPr>
+          <a:xfrm>
+            <a:off x="4185924" y="5748213"/>
+            <a:ext cx="3706792" cy="279607"/>
+          </a:xfrm>
+          <a:prstGeom prst="roundRect">
+            <a:avLst/>
+          </a:prstGeom>
+          <a:noFill/>
+          <a:ln w="28575">
+            <a:solidFill>
+              <a:srgbClr val="FFC000"/>
+            </a:solidFill>
+          </a:ln>
+        </p:spPr>
+        <p:style>
+          <a:lnRef idx="2">
+            <a:schemeClr val="accent1">
+              <a:shade val="15000"/>
+            </a:schemeClr>
+          </a:lnRef>
+          <a:fillRef idx="1">
+            <a:schemeClr val="accent1"/>
+          </a:fillRef>
+          <a:effectRef idx="0">
+            <a:schemeClr val="accent1"/>
+          </a:effectRef>
+          <a:fontRef idx="minor">
+            <a:schemeClr val="lt1"/>
+          </a:fontRef>
+        </p:style>
+        <p:txBody>
+          <a:bodyPr rtlCol="0" anchor="ctr"/>
+          <a:lstStyle/>
+          <a:p>
+            <a:pPr algn="ctr"/>
+            <a:endParaRPr lang="en-US"/>
+          </a:p>
+        </p:txBody>
+      </p:sp>
+    </p:spTree>
+    <p:extLst>
+      <p:ext uri="{BB962C8B-B14F-4D97-AF65-F5344CB8AC3E}">
+        <p14:creationId xmlns:p14="http://schemas.microsoft.com/office/powerpoint/2010/main" val="3715958519"/>
+      </p:ext>
+    </p:extLst>
+  </p:cSld>
+  <p:clrMapOvr>
+    <a:masterClrMapping/>
+  </p:clrMapOvr>
+</p:sld>
+</file>
+
+<file path=ppt/slides/slide7.xml><?xml version="1.0" encoding="utf-8"?>
+<p:sld xmlns:a="http://schemas.openxmlformats.org/drawingml/2006/main" xmlns:r="http://schemas.openxmlformats.org/officeDocument/2006/relationships" xmlns:p="http://schemas.openxmlformats.org/presentationml/2006/main">
+  <p:cSld>
+    <p:spTree>
+      <p:nvGrpSpPr>
+        <p:cNvPr id="1" name=""/>
+        <p:cNvGrpSpPr/>
+        <p:nvPr/>
+      </p:nvGrpSpPr>
+      <p:grpSpPr>
+        <a:xfrm>
+          <a:off x="0" y="0"/>
+          <a:ext cx="0" cy="0"/>
+          <a:chOff x="0" y="0"/>
+          <a:chExt cx="0" cy="0"/>
+        </a:xfrm>
+      </p:grpSpPr>
+      <p:sp>
+        <p:nvSpPr>
+          <p:cNvPr id="2" name="Title 1">
+            <a:extLst>
+              <a:ext uri="{FF2B5EF4-FFF2-40B4-BE49-F238E27FC236}">
+                <a16:creationId xmlns:a16="http://schemas.microsoft.com/office/drawing/2014/main" id="{13968C42-1848-2BDC-BF07-80C49BCF9881}"/>
+              </a:ext>
+            </a:extLst>
+          </p:cNvPr>
+          <p:cNvSpPr>
+            <a:spLocks noGrp="1"/>
+          </p:cNvSpPr>
+          <p:nvPr>
+            <p:ph type="title"/>
+          </p:nvPr>
+        </p:nvSpPr>
+        <p:spPr/>
+        <p:txBody>
+          <a:bodyPr/>
+          <a:lstStyle/>
+          <a:p>
+            <a:r>
+              <a:rPr lang="sv-SE" dirty="0"/>
+              <a:t>Process</a:t>
+            </a:r>
+            <a:endParaRPr lang="en-US" dirty="0"/>
+          </a:p>
+        </p:txBody>
+      </p:sp>
+      <p:sp>
+        <p:nvSpPr>
+          <p:cNvPr id="3" name="Content Placeholder 2">
+            <a:extLst>
+              <a:ext uri="{FF2B5EF4-FFF2-40B4-BE49-F238E27FC236}">
+                <a16:creationId xmlns:a16="http://schemas.microsoft.com/office/drawing/2014/main" id="{A92A6823-03D7-8B26-56C8-0B05A48CE4A9}"/>
+              </a:ext>
+            </a:extLst>
+          </p:cNvPr>
+          <p:cNvSpPr>
+            <a:spLocks noGrp="1"/>
+          </p:cNvSpPr>
+          <p:nvPr>
+            <p:ph idx="1"/>
+          </p:nvPr>
+        </p:nvSpPr>
+        <p:spPr>
+          <a:xfrm>
+            <a:off x="838200" y="1825625"/>
+            <a:ext cx="10515600" cy="560736"/>
+          </a:xfrm>
+        </p:spPr>
+        <p:txBody>
+          <a:bodyPr/>
+          <a:lstStyle/>
+          <a:p>
+            <a:pPr marL="514350" indent="-514350">
+              <a:buAutoNum type="arabicPeriod"/>
+            </a:pPr>
+            <a:r>
+              <a:rPr lang="en-US" b="1" dirty="0"/>
+              <a:t>Fork</a:t>
+            </a:r>
+            <a:r>
+              <a:rPr lang="en-US" dirty="0"/>
+              <a:t> the repository </a:t>
+            </a:r>
+            <a:r>
+              <a:rPr lang="en-US" dirty="0">
+                <a:hlinkClick r:id="rId2"/>
+              </a:rPr>
+              <a:t>https://github.com/aire-ws/aire24-activity</a:t>
+            </a:r>
+            <a:r>
+              <a:rPr lang="en-US" dirty="0"/>
+              <a:t> </a:t>
+            </a:r>
+          </a:p>
+          <a:p>
+            <a:pPr marL="0" indent="0">
+              <a:buNone/>
+            </a:pPr>
+            <a:endParaRPr lang="en-US" dirty="0"/>
+          </a:p>
+        </p:txBody>
+      </p:sp>
+      <p:sp>
+        <p:nvSpPr>
+          <p:cNvPr id="4" name="Date Placeholder 3">
+            <a:extLst>
+              <a:ext uri="{FF2B5EF4-FFF2-40B4-BE49-F238E27FC236}">
+                <a16:creationId xmlns:a16="http://schemas.microsoft.com/office/drawing/2014/main" id="{EE65A6DE-DA56-B80E-645D-A63444363F71}"/>
+              </a:ext>
+            </a:extLst>
+          </p:cNvPr>
+          <p:cNvSpPr>
+            <a:spLocks noGrp="1"/>
+          </p:cNvSpPr>
+          <p:nvPr>
+            <p:ph type="dt" sz="half" idx="10"/>
+          </p:nvPr>
+        </p:nvSpPr>
+        <p:spPr/>
+        <p:txBody>
+          <a:bodyPr/>
+          <a:lstStyle/>
+          <a:p>
+            <a:fld id="{87D4ACF0-553C-49B0-BBA6-EA2ECC95E3DB}" type="datetime1">
+              <a:rPr lang="de-DE" smtClean="0"/>
+              <a:t>24.06.2024</a:t>
+            </a:fld>
+            <a:endParaRPr lang="en-US"/>
+          </a:p>
+        </p:txBody>
+      </p:sp>
+      <p:sp>
+        <p:nvSpPr>
+          <p:cNvPr id="5" name="Footer Placeholder 4">
+            <a:extLst>
+              <a:ext uri="{FF2B5EF4-FFF2-40B4-BE49-F238E27FC236}">
+                <a16:creationId xmlns:a16="http://schemas.microsoft.com/office/drawing/2014/main" id="{9B10851B-C516-2234-7753-7A3EDACD1BA7}"/>
+              </a:ext>
+            </a:extLst>
+          </p:cNvPr>
+          <p:cNvSpPr>
+            <a:spLocks noGrp="1"/>
+          </p:cNvSpPr>
+          <p:nvPr>
+            <p:ph type="ftr" sz="quarter" idx="11"/>
+          </p:nvPr>
+        </p:nvSpPr>
+        <p:spPr/>
+        <p:txBody>
+          <a:bodyPr/>
+          <a:lstStyle/>
+          <a:p>
+            <a:r>
+              <a:rPr lang="en-US"/>
+              <a:t>AIRE'24</a:t>
+            </a:r>
+          </a:p>
+        </p:txBody>
+      </p:sp>
+      <p:sp>
+        <p:nvSpPr>
+          <p:cNvPr id="6" name="Slide Number Placeholder 5">
+            <a:extLst>
+              <a:ext uri="{FF2B5EF4-FFF2-40B4-BE49-F238E27FC236}">
+                <a16:creationId xmlns:a16="http://schemas.microsoft.com/office/drawing/2014/main" id="{ADBB0FCE-4578-2577-70C7-77AB20E6E8AE}"/>
+              </a:ext>
+            </a:extLst>
+          </p:cNvPr>
+          <p:cNvSpPr>
+            <a:spLocks noGrp="1"/>
+          </p:cNvSpPr>
+          <p:nvPr>
+            <p:ph type="sldNum" sz="quarter" idx="12"/>
+          </p:nvPr>
+        </p:nvSpPr>
+        <p:spPr/>
+        <p:txBody>
+          <a:bodyPr/>
+          <a:lstStyle/>
+          <a:p>
+            <a:fld id="{8CCD81E8-6E22-4792-904F-C3E1A440A2A0}" type="slidenum">
+              <a:rPr lang="en-US" smtClean="0"/>
+              <a:t>7</a:t>
             </a:fld>
             <a:endParaRPr lang="en-US"/>
           </a:p>
@@ -14299,7 +15316,7 @@
 </p:sld>
 </file>
 
-<file path=ppt/slides/slide7.xml><?xml version="1.0" encoding="utf-8"?>
+<file path=ppt/slides/slide8.xml><?xml version="1.0" encoding="utf-8"?>
 <p:sld xmlns:a="http://schemas.openxmlformats.org/drawingml/2006/main" xmlns:r="http://schemas.openxmlformats.org/officeDocument/2006/relationships" xmlns:p="http://schemas.openxmlformats.org/presentationml/2006/main">
   <p:cSld>
     <p:spTree>
@@ -14409,7 +15426,7 @@
           <a:p>
             <a:fld id="{87D4ACF0-553C-49B0-BBA6-EA2ECC95E3DB}" type="datetime1">
               <a:rPr lang="de-DE" smtClean="0"/>
-              <a:t>20.06.2024</a:t>
+              <a:t>24.06.2024</a:t>
             </a:fld>
             <a:endParaRPr lang="en-US"/>
           </a:p>
@@ -14466,7 +15483,7 @@
           <a:p>
             <a:fld id="{8CCD81E8-6E22-4792-904F-C3E1A440A2A0}" type="slidenum">
               <a:rPr lang="en-US" smtClean="0"/>
-              <a:t>7</a:t>
+              <a:t>8</a:t>
             </a:fld>
             <a:endParaRPr lang="en-US"/>
           </a:p>
@@ -14618,7 +15635,7 @@
 </p:sld>
 </file>
 
-<file path=ppt/slides/slide8.xml><?xml version="1.0" encoding="utf-8"?>
+<file path=ppt/slides/slide9.xml><?xml version="1.0" encoding="utf-8"?>
 <p:sld xmlns:a="http://schemas.openxmlformats.org/drawingml/2006/main" xmlns:r="http://schemas.openxmlformats.org/officeDocument/2006/relationships" xmlns:p="http://schemas.openxmlformats.org/presentationml/2006/main">
   <p:cSld>
     <p:spTree>
@@ -14727,7 +15744,7 @@
           <a:p>
             <a:fld id="{87D4ACF0-553C-49B0-BBA6-EA2ECC95E3DB}" type="datetime1">
               <a:rPr lang="de-DE" smtClean="0"/>
-              <a:t>20.06.2024</a:t>
+              <a:t>24.06.2024</a:t>
             </a:fld>
             <a:endParaRPr lang="en-US"/>
           </a:p>
@@ -14784,7 +15801,7 @@
           <a:p>
             <a:fld id="{8CCD81E8-6E22-4792-904F-C3E1A440A2A0}" type="slidenum">
               <a:rPr lang="en-US" smtClean="0"/>
-              <a:t>8</a:t>
+              <a:t>9</a:t>
             </a:fld>
             <a:endParaRPr lang="en-US"/>
           </a:p>
@@ -14824,385 +15841,6 @@
     <p:extLst>
       <p:ext uri="{BB962C8B-B14F-4D97-AF65-F5344CB8AC3E}">
         <p14:creationId xmlns:p14="http://schemas.microsoft.com/office/powerpoint/2010/main" val="2195472737"/>
-      </p:ext>
-    </p:extLst>
-  </p:cSld>
-  <p:clrMapOvr>
-    <a:masterClrMapping/>
-  </p:clrMapOvr>
-</p:sld>
-</file>
-
-<file path=ppt/slides/slide9.xml><?xml version="1.0" encoding="utf-8"?>
-<p:sld xmlns:a="http://schemas.openxmlformats.org/drawingml/2006/main" xmlns:r="http://schemas.openxmlformats.org/officeDocument/2006/relationships" xmlns:p="http://schemas.openxmlformats.org/presentationml/2006/main">
-  <p:cSld>
-    <p:spTree>
-      <p:nvGrpSpPr>
-        <p:cNvPr id="1" name=""/>
-        <p:cNvGrpSpPr/>
-        <p:nvPr/>
-      </p:nvGrpSpPr>
-      <p:grpSpPr>
-        <a:xfrm>
-          <a:off x="0" y="0"/>
-          <a:ext cx="0" cy="0"/>
-          <a:chOff x="0" y="0"/>
-          <a:chExt cx="0" cy="0"/>
-        </a:xfrm>
-      </p:grpSpPr>
-      <p:sp>
-        <p:nvSpPr>
-          <p:cNvPr id="2" name="Title 1">
-            <a:extLst>
-              <a:ext uri="{FF2B5EF4-FFF2-40B4-BE49-F238E27FC236}">
-                <a16:creationId xmlns:a16="http://schemas.microsoft.com/office/drawing/2014/main" id="{7682A068-B61D-B240-CDCD-ACEE5A89BC77}"/>
-              </a:ext>
-            </a:extLst>
-          </p:cNvPr>
-          <p:cNvSpPr>
-            <a:spLocks noGrp="1"/>
-          </p:cNvSpPr>
-          <p:nvPr>
-            <p:ph type="title"/>
-          </p:nvPr>
-        </p:nvSpPr>
-        <p:spPr/>
-        <p:txBody>
-          <a:bodyPr/>
-          <a:lstStyle/>
-          <a:p>
-            <a:r>
-              <a:rPr lang="sv-SE" dirty="0"/>
-              <a:t>Process</a:t>
-            </a:r>
-            <a:endParaRPr lang="en-US" dirty="0"/>
-          </a:p>
-        </p:txBody>
-      </p:sp>
-      <p:sp>
-        <p:nvSpPr>
-          <p:cNvPr id="4" name="Date Placeholder 3">
-            <a:extLst>
-              <a:ext uri="{FF2B5EF4-FFF2-40B4-BE49-F238E27FC236}">
-                <a16:creationId xmlns:a16="http://schemas.microsoft.com/office/drawing/2014/main" id="{F165B01C-24D6-A9E1-8EFA-5E9136366050}"/>
-              </a:ext>
-            </a:extLst>
-          </p:cNvPr>
-          <p:cNvSpPr>
-            <a:spLocks noGrp="1"/>
-          </p:cNvSpPr>
-          <p:nvPr>
-            <p:ph type="dt" sz="half" idx="10"/>
-          </p:nvPr>
-        </p:nvSpPr>
-        <p:spPr/>
-        <p:txBody>
-          <a:bodyPr/>
-          <a:lstStyle/>
-          <a:p>
-            <a:fld id="{87D4ACF0-553C-49B0-BBA6-EA2ECC95E3DB}" type="datetime1">
-              <a:rPr lang="de-DE" smtClean="0"/>
-              <a:t>20.06.2024</a:t>
-            </a:fld>
-            <a:endParaRPr lang="en-US"/>
-          </a:p>
-        </p:txBody>
-      </p:sp>
-      <p:sp>
-        <p:nvSpPr>
-          <p:cNvPr id="5" name="Footer Placeholder 4">
-            <a:extLst>
-              <a:ext uri="{FF2B5EF4-FFF2-40B4-BE49-F238E27FC236}">
-                <a16:creationId xmlns:a16="http://schemas.microsoft.com/office/drawing/2014/main" id="{20044D52-363C-F514-978E-71D0DEE2E2CE}"/>
-              </a:ext>
-            </a:extLst>
-          </p:cNvPr>
-          <p:cNvSpPr>
-            <a:spLocks noGrp="1"/>
-          </p:cNvSpPr>
-          <p:nvPr>
-            <p:ph type="ftr" sz="quarter" idx="11"/>
-          </p:nvPr>
-        </p:nvSpPr>
-        <p:spPr/>
-        <p:txBody>
-          <a:bodyPr/>
-          <a:lstStyle/>
-          <a:p>
-            <a:r>
-              <a:rPr lang="en-US"/>
-              <a:t>AIRE'24</a:t>
-            </a:r>
-          </a:p>
-        </p:txBody>
-      </p:sp>
-      <p:sp>
-        <p:nvSpPr>
-          <p:cNvPr id="6" name="Slide Number Placeholder 5">
-            <a:extLst>
-              <a:ext uri="{FF2B5EF4-FFF2-40B4-BE49-F238E27FC236}">
-                <a16:creationId xmlns:a16="http://schemas.microsoft.com/office/drawing/2014/main" id="{30D9BBF3-3E89-1D80-9560-29D3D9EA74DB}"/>
-              </a:ext>
-            </a:extLst>
-          </p:cNvPr>
-          <p:cNvSpPr>
-            <a:spLocks noGrp="1"/>
-          </p:cNvSpPr>
-          <p:nvPr>
-            <p:ph type="sldNum" sz="quarter" idx="12"/>
-          </p:nvPr>
-        </p:nvSpPr>
-        <p:spPr/>
-        <p:txBody>
-          <a:bodyPr/>
-          <a:lstStyle/>
-          <a:p>
-            <a:fld id="{8CCD81E8-6E22-4792-904F-C3E1A440A2A0}" type="slidenum">
-              <a:rPr lang="en-US" smtClean="0"/>
-              <a:t>9</a:t>
-            </a:fld>
-            <a:endParaRPr lang="en-US"/>
-          </a:p>
-        </p:txBody>
-      </p:sp>
-      <p:pic>
-        <p:nvPicPr>
-          <p:cNvPr id="8" name="Picture 7">
-            <a:extLst>
-              <a:ext uri="{FF2B5EF4-FFF2-40B4-BE49-F238E27FC236}">
-                <a16:creationId xmlns:a16="http://schemas.microsoft.com/office/drawing/2014/main" id="{2684B3FB-18EE-D6AD-8B73-520C60AF8B29}"/>
-              </a:ext>
-            </a:extLst>
-          </p:cNvPr>
-          <p:cNvPicPr>
-            <a:picLocks noChangeAspect="1"/>
-          </p:cNvPicPr>
-          <p:nvPr/>
-        </p:nvPicPr>
-        <p:blipFill>
-          <a:blip r:embed="rId2"/>
-          <a:stretch>
-            <a:fillRect/>
-          </a:stretch>
-        </p:blipFill>
-        <p:spPr>
-          <a:xfrm>
-            <a:off x="2010229" y="2792257"/>
-            <a:ext cx="8171542" cy="4065743"/>
-          </a:xfrm>
-          <a:prstGeom prst="rect">
-            <a:avLst/>
-          </a:prstGeom>
-        </p:spPr>
-      </p:pic>
-      <p:sp>
-        <p:nvSpPr>
-          <p:cNvPr id="9" name="Content Placeholder 2">
-            <a:extLst>
-              <a:ext uri="{FF2B5EF4-FFF2-40B4-BE49-F238E27FC236}">
-                <a16:creationId xmlns:a16="http://schemas.microsoft.com/office/drawing/2014/main" id="{27E065FA-4B8B-8EBB-4853-97396ABA722F}"/>
-              </a:ext>
-            </a:extLst>
-          </p:cNvPr>
-          <p:cNvSpPr>
-            <a:spLocks noGrp="1"/>
-          </p:cNvSpPr>
-          <p:nvPr>
-            <p:ph idx="1"/>
-          </p:nvPr>
-        </p:nvSpPr>
-        <p:spPr>
-          <a:xfrm>
-            <a:off x="838200" y="1825625"/>
-            <a:ext cx="10515600" cy="4351338"/>
-          </a:xfrm>
-        </p:spPr>
-        <p:txBody>
-          <a:bodyPr/>
-          <a:lstStyle/>
-          <a:p>
-            <a:pPr marL="514350" indent="-514350">
-              <a:buFont typeface="+mj-lt"/>
-              <a:buAutoNum type="arabicPeriod" startAt="3"/>
-            </a:pPr>
-            <a:r>
-              <a:rPr lang="en-US" b="1" dirty="0"/>
-              <a:t>Select an LLM </a:t>
-            </a:r>
-            <a:r>
-              <a:rPr lang="en-US" dirty="0"/>
-              <a:t>and enter the name and version to the </a:t>
-            </a:r>
-            <a:r>
-              <a:rPr lang="en-US" i="1" dirty="0"/>
-              <a:t>activity-report.md</a:t>
-            </a:r>
-          </a:p>
-          <a:p>
-            <a:endParaRPr lang="en-US" dirty="0"/>
-          </a:p>
-        </p:txBody>
-      </p:sp>
-      <p:sp>
-        <p:nvSpPr>
-          <p:cNvPr id="10" name="Rectangle: Rounded Corners 9">
-            <a:extLst>
-              <a:ext uri="{FF2B5EF4-FFF2-40B4-BE49-F238E27FC236}">
-                <a16:creationId xmlns:a16="http://schemas.microsoft.com/office/drawing/2014/main" id="{B521C97E-D883-F6ED-6791-92D32B0A6E9F}"/>
-              </a:ext>
-            </a:extLst>
-          </p:cNvPr>
-          <p:cNvSpPr/>
-          <p:nvPr/>
-        </p:nvSpPr>
-        <p:spPr>
-          <a:xfrm>
-            <a:off x="5189558" y="5219700"/>
-            <a:ext cx="1582717" cy="190500"/>
-          </a:xfrm>
-          <a:prstGeom prst="roundRect">
-            <a:avLst/>
-          </a:prstGeom>
-          <a:noFill/>
-          <a:ln w="28575">
-            <a:solidFill>
-              <a:srgbClr val="FFC000"/>
-            </a:solidFill>
-          </a:ln>
-        </p:spPr>
-        <p:style>
-          <a:lnRef idx="2">
-            <a:schemeClr val="accent1">
-              <a:shade val="15000"/>
-            </a:schemeClr>
-          </a:lnRef>
-          <a:fillRef idx="1">
-            <a:schemeClr val="accent1"/>
-          </a:fillRef>
-          <a:effectRef idx="0">
-            <a:schemeClr val="accent1"/>
-          </a:effectRef>
-          <a:fontRef idx="minor">
-            <a:schemeClr val="lt1"/>
-          </a:fontRef>
-        </p:style>
-        <p:txBody>
-          <a:bodyPr rtlCol="0" anchor="ctr"/>
-          <a:lstStyle/>
-          <a:p>
-            <a:pPr algn="ctr"/>
-            <a:endParaRPr lang="en-US"/>
-          </a:p>
-        </p:txBody>
-      </p:sp>
-      <p:sp>
-        <p:nvSpPr>
-          <p:cNvPr id="11" name="Rectangle: Rounded Corners 10">
-            <a:extLst>
-              <a:ext uri="{FF2B5EF4-FFF2-40B4-BE49-F238E27FC236}">
-                <a16:creationId xmlns:a16="http://schemas.microsoft.com/office/drawing/2014/main" id="{E220AFCB-84BE-D888-7499-0C52C60DA546}"/>
-              </a:ext>
-            </a:extLst>
-          </p:cNvPr>
-          <p:cNvSpPr/>
-          <p:nvPr/>
-        </p:nvSpPr>
-        <p:spPr>
-          <a:xfrm>
-            <a:off x="2712719" y="6356350"/>
-            <a:ext cx="6726555" cy="311150"/>
-          </a:xfrm>
-          <a:prstGeom prst="roundRect">
-            <a:avLst/>
-          </a:prstGeom>
-          <a:noFill/>
-          <a:ln w="28575">
-            <a:solidFill>
-              <a:srgbClr val="FFC000"/>
-            </a:solidFill>
-          </a:ln>
-        </p:spPr>
-        <p:style>
-          <a:lnRef idx="2">
-            <a:schemeClr val="accent1">
-              <a:shade val="15000"/>
-            </a:schemeClr>
-          </a:lnRef>
-          <a:fillRef idx="1">
-            <a:schemeClr val="accent1"/>
-          </a:fillRef>
-          <a:effectRef idx="0">
-            <a:schemeClr val="accent1"/>
-          </a:effectRef>
-          <a:fontRef idx="minor">
-            <a:schemeClr val="lt1"/>
-          </a:fontRef>
-        </p:style>
-        <p:txBody>
-          <a:bodyPr rtlCol="0" anchor="ctr"/>
-          <a:lstStyle/>
-          <a:p>
-            <a:pPr algn="ctr"/>
-            <a:endParaRPr lang="en-US"/>
-          </a:p>
-        </p:txBody>
-      </p:sp>
-      <p:sp>
-        <p:nvSpPr>
-          <p:cNvPr id="12" name="Rectangle: Rounded Corners 11">
-            <a:extLst>
-              <a:ext uri="{FF2B5EF4-FFF2-40B4-BE49-F238E27FC236}">
-                <a16:creationId xmlns:a16="http://schemas.microsoft.com/office/drawing/2014/main" id="{6DAB1AD9-D021-EBE2-73CF-62D0F8C40CE8}"/>
-              </a:ext>
-            </a:extLst>
-          </p:cNvPr>
-          <p:cNvSpPr/>
-          <p:nvPr/>
-        </p:nvSpPr>
-        <p:spPr>
-          <a:xfrm>
-            <a:off x="5075259" y="2870200"/>
-            <a:ext cx="1141392" cy="190500"/>
-          </a:xfrm>
-          <a:prstGeom prst="roundRect">
-            <a:avLst/>
-          </a:prstGeom>
-          <a:noFill/>
-          <a:ln w="28575">
-            <a:solidFill>
-              <a:srgbClr val="FFC000"/>
-            </a:solidFill>
-          </a:ln>
-        </p:spPr>
-        <p:style>
-          <a:lnRef idx="2">
-            <a:schemeClr val="accent1">
-              <a:shade val="15000"/>
-            </a:schemeClr>
-          </a:lnRef>
-          <a:fillRef idx="1">
-            <a:schemeClr val="accent1"/>
-          </a:fillRef>
-          <a:effectRef idx="0">
-            <a:schemeClr val="accent1"/>
-          </a:effectRef>
-          <a:fontRef idx="minor">
-            <a:schemeClr val="lt1"/>
-          </a:fontRef>
-        </p:style>
-        <p:txBody>
-          <a:bodyPr rtlCol="0" anchor="ctr"/>
-          <a:lstStyle/>
-          <a:p>
-            <a:pPr algn="ctr"/>
-            <a:endParaRPr lang="en-US"/>
-          </a:p>
-        </p:txBody>
-      </p:sp>
-    </p:spTree>
-    <p:extLst>
-      <p:ext uri="{BB962C8B-B14F-4D97-AF65-F5344CB8AC3E}">
-        <p14:creationId xmlns:p14="http://schemas.microsoft.com/office/powerpoint/2010/main" val="2908035817"/>
       </p:ext>
     </p:extLst>
   </p:cSld>

</xml_diff>